<commit_message>
update staff arrangements slide
</commit_message>
<xml_diff>
--- a/templates/worship.pptx
+++ b/templates/worship.pptx
@@ -20693,7 +20693,7 @@
             </a:pPr>
             <a:r>
               <a:rPr lang="en" dirty="0" err="1"/>
-              <a:t>月份事奉人员</a:t>
+              <a:t>month月份事奉人员</a:t>
             </a:r>
             <a:endParaRPr dirty="0"/>
           </a:p>
@@ -20706,14 +20706,14 @@
           <p:nvPr>
             <p:extLst>
               <p:ext uri="{D42A27DB-BD31-4B8C-83A1-F6EECF244321}">
-                <p14:modId xmlns:p14="http://schemas.microsoft.com/office/powerpoint/2010/main" val="246021508"/>
+                <p14:modId xmlns:p14="http://schemas.microsoft.com/office/powerpoint/2010/main" val="628542040"/>
               </p:ext>
             </p:extLst>
           </p:nvPr>
         </p:nvGraphicFramePr>
         <p:xfrm>
           <a:off x="952500" y="1428750"/>
-          <a:ext cx="7239000" cy="3063060"/>
+          <a:ext cx="7239000" cy="3154500"/>
         </p:xfrm>
         <a:graphic>
           <a:graphicData uri="http://schemas.openxmlformats.org/drawingml/2006/table">
@@ -20865,7 +20865,7 @@
                           <a:cs typeface="SimHei"/>
                           <a:sym typeface="SimHei"/>
                         </a:rPr>
-                        <a:t>日</a:t>
+                        <a:t>ls日</a:t>
                       </a:r>
                       <a:endParaRPr dirty="0"/>
                     </a:p>
@@ -20938,7 +20938,7 @@
                           <a:cs typeface="SimHei"/>
                           <a:sym typeface="SimHei"/>
                         </a:rPr>
-                        <a:t>日</a:t>
+                        <a:t>ts日</a:t>
                       </a:r>
                       <a:endParaRPr dirty="0"/>
                     </a:p>
@@ -21011,7 +21011,7 @@
                           <a:cs typeface="SimHei"/>
                           <a:sym typeface="SimHei"/>
                         </a:rPr>
-                        <a:t>日</a:t>
+                        <a:t>ns日</a:t>
                       </a:r>
                       <a:endParaRPr dirty="0"/>
                     </a:p>
@@ -21084,7 +21084,7 @@
                           <a:cs typeface="SimHei"/>
                           <a:sym typeface="SimHei"/>
                         </a:rPr>
-                        <a:t>日</a:t>
+                        <a:t>nns日</a:t>
                       </a:r>
                       <a:endParaRPr dirty="0"/>
                     </a:p>
@@ -21153,7 +21153,7 @@
                         <a:buNone/>
                       </a:pPr>
                       <a:r>
-                        <a:rPr lang="en" sz="2000" b="1">
+                        <a:rPr lang="en" sz="2000" b="1" dirty="0" err="1">
                           <a:solidFill>
                             <a:srgbClr val="FFFFFF"/>
                           </a:solidFill>
@@ -21164,7 +21164,7 @@
                         </a:rPr>
                         <a:t>带领</a:t>
                       </a:r>
-                      <a:endParaRPr sz="2000" b="1">
+                      <a:endParaRPr sz="2000" b="1" dirty="0">
                         <a:solidFill>
                           <a:srgbClr val="FFFFFF"/>
                         </a:solidFill>
@@ -21173,67 +21173,6 @@
                         <a:cs typeface="SimHei"/>
                         <a:sym typeface="SimHei"/>
                       </a:endParaRPr>
-                    </a:p>
-                  </a:txBody>
-                  <a:tcPr marL="91425" marR="91425" marT="91425" marB="91425">
-                    <a:lnL w="9525" cap="flat" cmpd="sng">
-                      <a:solidFill>
-                        <a:srgbClr val="9E9E9E"/>
-                      </a:solidFill>
-                      <a:prstDash val="solid"/>
-                      <a:round/>
-                      <a:headEnd type="none" w="sm" len="sm"/>
-                      <a:tailEnd type="none" w="sm" len="sm"/>
-                    </a:lnL>
-                    <a:lnR w="9525" cap="flat" cmpd="sng">
-                      <a:solidFill>
-                        <a:srgbClr val="9E9E9E"/>
-                      </a:solidFill>
-                      <a:prstDash val="solid"/>
-                      <a:round/>
-                      <a:headEnd type="none" w="sm" len="sm"/>
-                      <a:tailEnd type="none" w="sm" len="sm"/>
-                    </a:lnR>
-                    <a:lnT w="9525" cap="flat" cmpd="sng">
-                      <a:solidFill>
-                        <a:srgbClr val="9E9E9E"/>
-                      </a:solidFill>
-                      <a:prstDash val="solid"/>
-                      <a:round/>
-                      <a:headEnd type="none" w="sm" len="sm"/>
-                      <a:tailEnd type="none" w="sm" len="sm"/>
-                    </a:lnT>
-                    <a:lnB w="9525" cap="flat" cmpd="sng">
-                      <a:solidFill>
-                        <a:srgbClr val="9E9E9E"/>
-                      </a:solidFill>
-                      <a:prstDash val="solid"/>
-                      <a:round/>
-                      <a:headEnd type="none" w="sm" len="sm"/>
-                      <a:tailEnd type="none" w="sm" len="sm"/>
-                    </a:lnB>
-                  </a:tcPr>
-                </a:tc>
-                <a:tc>
-                  <a:txBody>
-                    <a:bodyPr/>
-                    <a:lstStyle/>
-                    <a:p>
-                      <a:pPr marL="0" lvl="0" indent="0" algn="l" rtl="0">
-                        <a:spcBef>
-                          <a:spcPts val="0"/>
-                        </a:spcBef>
-                        <a:spcAft>
-                          <a:spcPts val="0"/>
-                        </a:spcAft>
-                        <a:buClr>
-                          <a:schemeClr val="dk1"/>
-                        </a:buClr>
-                        <a:buSzPts val="1100"/>
-                        <a:buFont typeface="Arial"/>
-                        <a:buNone/>
-                      </a:pPr>
-                      <a:endParaRPr dirty="0"/>
                     </a:p>
                   </a:txBody>
                   <a:tcPr marL="91425" marR="91425" marT="91425" marB="91425">
@@ -21299,6 +21238,94 @@
                         <a:tabLst/>
                         <a:defRPr/>
                       </a:pPr>
+                      <a:r>
+                        <a:rPr lang="en-CA" sz="2000" b="0" i="0" u="none" strike="noStrike" cap="none" dirty="0" err="1">
+                          <a:solidFill>
+                            <a:schemeClr val="lt1"/>
+                          </a:solidFill>
+                          <a:latin typeface="SimHei"/>
+                          <a:ea typeface="SimHei"/>
+                          <a:sym typeface="SimHei"/>
+                        </a:rPr>
+                        <a:t>lsdailing</a:t>
+                      </a:r>
+                      <a:endParaRPr sz="2000" dirty="0"/>
+                    </a:p>
+                  </a:txBody>
+                  <a:tcPr marL="91425" marR="91425" marT="91425" marB="91425">
+                    <a:lnL w="9525" cap="flat" cmpd="sng">
+                      <a:solidFill>
+                        <a:srgbClr val="9E9E9E"/>
+                      </a:solidFill>
+                      <a:prstDash val="solid"/>
+                      <a:round/>
+                      <a:headEnd type="none" w="sm" len="sm"/>
+                      <a:tailEnd type="none" w="sm" len="sm"/>
+                    </a:lnL>
+                    <a:lnR w="9525" cap="flat" cmpd="sng">
+                      <a:solidFill>
+                        <a:srgbClr val="9E9E9E"/>
+                      </a:solidFill>
+                      <a:prstDash val="solid"/>
+                      <a:round/>
+                      <a:headEnd type="none" w="sm" len="sm"/>
+                      <a:tailEnd type="none" w="sm" len="sm"/>
+                    </a:lnR>
+                    <a:lnT w="9525" cap="flat" cmpd="sng">
+                      <a:solidFill>
+                        <a:srgbClr val="9E9E9E"/>
+                      </a:solidFill>
+                      <a:prstDash val="solid"/>
+                      <a:round/>
+                      <a:headEnd type="none" w="sm" len="sm"/>
+                      <a:tailEnd type="none" w="sm" len="sm"/>
+                    </a:lnT>
+                    <a:lnB w="9525" cap="flat" cmpd="sng">
+                      <a:solidFill>
+                        <a:srgbClr val="9E9E9E"/>
+                      </a:solidFill>
+                      <a:prstDash val="solid"/>
+                      <a:round/>
+                      <a:headEnd type="none" w="sm" len="sm"/>
+                      <a:tailEnd type="none" w="sm" len="sm"/>
+                    </a:lnB>
+                  </a:tcPr>
+                </a:tc>
+                <a:tc>
+                  <a:txBody>
+                    <a:bodyPr/>
+                    <a:lstStyle/>
+                    <a:p>
+                      <a:pPr marL="0" marR="0" lvl="0" indent="0" algn="l" defTabSz="914400" rtl="0" eaLnBrk="1" fontAlgn="auto" latinLnBrk="0" hangingPunct="1">
+                        <a:lnSpc>
+                          <a:spcPct val="100000"/>
+                        </a:lnSpc>
+                        <a:spcBef>
+                          <a:spcPts val="0"/>
+                        </a:spcBef>
+                        <a:spcAft>
+                          <a:spcPts val="0"/>
+                        </a:spcAft>
+                        <a:buClr>
+                          <a:schemeClr val="dk1"/>
+                        </a:buClr>
+                        <a:buSzPts val="1100"/>
+                        <a:buFont typeface="Arial"/>
+                        <a:buNone/>
+                        <a:tabLst/>
+                        <a:defRPr/>
+                      </a:pPr>
+                      <a:r>
+                        <a:rPr lang="en-CA" sz="2000" b="0" i="0" u="none" strike="noStrike" cap="none" dirty="0" err="1">
+                          <a:solidFill>
+                            <a:schemeClr val="lt1"/>
+                          </a:solidFill>
+                          <a:latin typeface="SimHei"/>
+                          <a:ea typeface="SimHei"/>
+                          <a:sym typeface="Arial"/>
+                        </a:rPr>
+                        <a:t>tsdailing</a:t>
+                      </a:r>
                       <a:endParaRPr lang="en-CA" sz="2000" b="0" i="0" u="none" strike="noStrike" cap="none" dirty="0">
                         <a:solidFill>
                           <a:schemeClr val="lt1"/>
@@ -21384,7 +21411,19 @@
                         <a:buFont typeface="Arial"/>
                         <a:buNone/>
                       </a:pPr>
-                      <a:endParaRPr dirty="0"/>
+                      <a:r>
+                        <a:rPr lang="en" sz="2000" dirty="0" err="1">
+                          <a:solidFill>
+                            <a:schemeClr val="lt1"/>
+                          </a:solidFill>
+                          <a:latin typeface="SimHei"/>
+                          <a:ea typeface="SimHei"/>
+                          <a:cs typeface="SimHei"/>
+                          <a:sym typeface="SimHei"/>
+                        </a:rPr>
+                        <a:t>nsdailing</a:t>
+                      </a:r>
+                      <a:endParaRPr sz="2000" dirty="0"/>
                     </a:p>
                   </a:txBody>
                   <a:tcPr marL="91425" marR="91425" marT="91425" marB="91425">
@@ -21445,6 +21484,18 @@
                         <a:buFont typeface="Arial"/>
                         <a:buNone/>
                       </a:pPr>
+                      <a:r>
+                        <a:rPr lang="en" sz="2000" dirty="0" err="1">
+                          <a:solidFill>
+                            <a:schemeClr val="lt1"/>
+                          </a:solidFill>
+                          <a:latin typeface="SimHei"/>
+                          <a:ea typeface="SimHei"/>
+                          <a:cs typeface="SimHei"/>
+                          <a:sym typeface="SimHei"/>
+                        </a:rPr>
+                        <a:t>nnsdailing</a:t>
+                      </a:r>
                       <a:endParaRPr lang="en-CA" sz="2000" dirty="0"/>
                     </a:p>
                   </a:txBody>
@@ -21589,6 +21640,17 @@
                         <a:buFont typeface="Arial"/>
                         <a:buNone/>
                       </a:pPr>
+                      <a:r>
+                        <a:rPr lang="en-CA" sz="2000" b="0" i="0" u="none" strike="noStrike" cap="none" dirty="0" err="1">
+                          <a:solidFill>
+                            <a:schemeClr val="lt1"/>
+                          </a:solidFill>
+                          <a:latin typeface="SimHei"/>
+                          <a:ea typeface="SimHei"/>
+                          <a:sym typeface="Arial"/>
+                        </a:rPr>
+                        <a:t>lssishi</a:t>
+                      </a:r>
                       <a:endParaRPr sz="2000" b="0" i="0" u="none" strike="noStrike" cap="none" dirty="0">
                         <a:solidFill>
                           <a:schemeClr val="lt1"/>
@@ -21657,6 +21719,18 @@
                         <a:buFont typeface="Arial"/>
                         <a:buNone/>
                       </a:pPr>
+                      <a:r>
+                        <a:rPr lang="en" sz="2000" dirty="0" err="1">
+                          <a:solidFill>
+                            <a:schemeClr val="lt1"/>
+                          </a:solidFill>
+                          <a:latin typeface="SimHei"/>
+                          <a:ea typeface="SimHei"/>
+                          <a:cs typeface="SimHei"/>
+                          <a:sym typeface="SimHei"/>
+                        </a:rPr>
+                        <a:t>tssishi</a:t>
+                      </a:r>
                       <a:endParaRPr lang="en" sz="2000" dirty="0">
                         <a:solidFill>
                           <a:schemeClr val="lt1"/>
@@ -21726,6 +21800,18 @@
                         <a:buFont typeface="Arial"/>
                         <a:buNone/>
                       </a:pPr>
+                      <a:r>
+                        <a:rPr lang="en" sz="2000" dirty="0" err="1">
+                          <a:solidFill>
+                            <a:schemeClr val="lt1"/>
+                          </a:solidFill>
+                          <a:latin typeface="SimHei"/>
+                          <a:ea typeface="SimHei"/>
+                          <a:cs typeface="SimHei"/>
+                          <a:sym typeface="SimHei"/>
+                        </a:rPr>
+                        <a:t>nssishi</a:t>
+                      </a:r>
                       <a:endParaRPr lang="en" sz="2000" dirty="0">
                         <a:solidFill>
                           <a:schemeClr val="lt1"/>
@@ -21795,7 +21881,19 @@
                         <a:buFont typeface="Arial"/>
                         <a:buNone/>
                       </a:pPr>
-                      <a:endParaRPr dirty="0"/>
+                      <a:r>
+                        <a:rPr lang="en" sz="2000" dirty="0" err="1">
+                          <a:solidFill>
+                            <a:schemeClr val="lt1"/>
+                          </a:solidFill>
+                          <a:latin typeface="SimHei"/>
+                          <a:ea typeface="SimHei"/>
+                          <a:cs typeface="SimHei"/>
+                          <a:sym typeface="SimHei"/>
+                        </a:rPr>
+                        <a:t>nnssishi</a:t>
+                      </a:r>
+                      <a:endParaRPr sz="2000" dirty="0"/>
                     </a:p>
                   </a:txBody>
                   <a:tcPr marL="91425" marR="91425" marT="91425" marB="91425">
@@ -21939,6 +22037,18 @@
                         <a:buFont typeface="Arial"/>
                         <a:buNone/>
                       </a:pPr>
+                      <a:r>
+                        <a:rPr lang="en-CA" sz="2000" dirty="0" err="1">
+                          <a:solidFill>
+                            <a:srgbClr val="FFFFFF"/>
+                          </a:solidFill>
+                          <a:latin typeface="SimHei"/>
+                          <a:ea typeface="SimHei"/>
+                          <a:cs typeface="SimHei"/>
+                          <a:sym typeface="SimHei"/>
+                        </a:rPr>
+                        <a:t>lssiqing</a:t>
+                      </a:r>
                       <a:endParaRPr sz="2000" dirty="0">
                         <a:solidFill>
                           <a:srgbClr val="FFFFFF"/>
@@ -22008,6 +22118,18 @@
                         <a:buFont typeface="Arial"/>
                         <a:buNone/>
                       </a:pPr>
+                      <a:r>
+                        <a:rPr lang="en-CA" sz="2000" dirty="0" err="1">
+                          <a:solidFill>
+                            <a:srgbClr val="FFFFFF"/>
+                          </a:solidFill>
+                          <a:latin typeface="SimHei"/>
+                          <a:ea typeface="SimHei"/>
+                          <a:cs typeface="SimHei"/>
+                          <a:sym typeface="SimHei"/>
+                        </a:rPr>
+                        <a:t>tssiqing</a:t>
+                      </a:r>
                       <a:endParaRPr sz="2000" dirty="0">
                         <a:solidFill>
                           <a:srgbClr val="FFFFFF"/>
@@ -22077,6 +22199,18 @@
                         <a:buFont typeface="Arial"/>
                         <a:buNone/>
                       </a:pPr>
+                      <a:r>
+                        <a:rPr lang="en-CA" sz="2000" dirty="0" err="1">
+                          <a:solidFill>
+                            <a:srgbClr val="FFFFFF"/>
+                          </a:solidFill>
+                          <a:latin typeface="SimHei"/>
+                          <a:ea typeface="SimHei"/>
+                          <a:cs typeface="SimHei"/>
+                          <a:sym typeface="SimHei"/>
+                        </a:rPr>
+                        <a:t>nssiqing</a:t>
+                      </a:r>
                       <a:endParaRPr sz="2000" dirty="0">
                         <a:solidFill>
                           <a:srgbClr val="FFFFFF"/>
@@ -22146,6 +22280,18 @@
                         <a:buFont typeface="Arial"/>
                         <a:buNone/>
                       </a:pPr>
+                      <a:r>
+                        <a:rPr lang="en" sz="2000" dirty="0" err="1">
+                          <a:solidFill>
+                            <a:schemeClr val="lt1"/>
+                          </a:solidFill>
+                          <a:latin typeface="SimHei"/>
+                          <a:ea typeface="SimHei"/>
+                          <a:cs typeface="SimHei"/>
+                          <a:sym typeface="SimHei"/>
+                        </a:rPr>
+                        <a:t>nnssiqing</a:t>
+                      </a:r>
                       <a:endParaRPr sz="2000" dirty="0">
                         <a:solidFill>
                           <a:srgbClr val="FFFFFF"/>
@@ -22294,7 +22440,7 @@
                         <a:buNone/>
                       </a:pPr>
                       <a:r>
-                        <a:rPr lang="en" sz="2000">
+                        <a:rPr lang="en" sz="2000" dirty="0" err="1">
                           <a:solidFill>
                             <a:srgbClr val="FFFFFF"/>
                           </a:solidFill>
@@ -22305,7 +22451,7 @@
                         </a:rPr>
                         <a:t>Sarah，Serena</a:t>
                       </a:r>
-                      <a:endParaRPr sz="2600">
+                      <a:endParaRPr sz="2600" dirty="0">
                         <a:solidFill>
                           <a:srgbClr val="FFFFFF"/>
                         </a:solidFill>

</xml_diff>

<commit_message>
update preaching topic slide
</commit_message>
<xml_diff>
--- a/templates/worship.pptx
+++ b/templates/worship.pptx
@@ -19309,7 +19309,7 @@
         <p:fade/>
       </p:transition>
     </mc:Choice>
-    <mc:Fallback xmlns="" xmlns:mv="urn:schemas-microsoft-com:mac:vml" xmlns:c="http://schemas.openxmlformats.org/drawingml/2006/chart" xmlns:dgm="http://schemas.openxmlformats.org/drawingml/2006/diagram" xmlns:o="urn:schemas-microsoft-com:office:office" xmlns:v="urn:schemas-microsoft-com:vml" xmlns:pvml="urn:schemas-microsoft-com:office:powerpoint" xmlns:com="http://schemas.openxmlformats.org/drawingml/2006/compatibility" xmlns:p15="http://schemas.microsoft.com/office/powerpoint/2012/main" xmlns:ahyp="http://schemas.microsoft.com/office/drawing/2018/hyperlinkcolor">
+    <mc:Fallback xmlns:ahyp="http://schemas.microsoft.com/office/drawing/2018/hyperlinkcolor" xmlns:p15="http://schemas.microsoft.com/office/powerpoint/2012/main" xmlns:com="http://schemas.openxmlformats.org/drawingml/2006/compatibility" xmlns:pvml="urn:schemas-microsoft-com:office:powerpoint" xmlns:v="urn:schemas-microsoft-com:vml" xmlns:o="urn:schemas-microsoft-com:office:office" xmlns:dgm="http://schemas.openxmlformats.org/drawingml/2006/diagram" xmlns:c="http://schemas.openxmlformats.org/drawingml/2006/chart" xmlns:mv="urn:schemas-microsoft-com:mac:vml" xmlns="">
       <p:transition>
         <p:fade/>
       </p:transition>
@@ -20706,7 +20706,7 @@
           <p:nvPr>
             <p:extLst>
               <p:ext uri="{D42A27DB-BD31-4B8C-83A1-F6EECF244321}">
-                <p14:modId xmlns:p14="http://schemas.microsoft.com/office/powerpoint/2010/main" val="628542040"/>
+                <p14:modId xmlns:p14="http://schemas.microsoft.com/office/powerpoint/2010/main" val="1547341952"/>
               </p:ext>
             </p:extLst>
           </p:nvPr>
@@ -22440,7 +22440,7 @@
                         <a:buNone/>
                       </a:pPr>
                       <a:r>
-                        <a:rPr lang="en" sz="2000" dirty="0" err="1">
+                        <a:rPr lang="en-US" sz="2000" dirty="0">
                           <a:solidFill>
                             <a:srgbClr val="FFFFFF"/>
                           </a:solidFill>
@@ -22449,7 +22449,19 @@
                           <a:cs typeface="SimHei"/>
                           <a:sym typeface="SimHei"/>
                         </a:rPr>
-                        <a:t>Sarah，Serena</a:t>
+                        <a:t>Joy</a:t>
+                      </a:r>
+                      <a:r>
+                        <a:rPr lang="en" sz="2000" dirty="0">
+                          <a:solidFill>
+                            <a:srgbClr val="FFFFFF"/>
+                          </a:solidFill>
+                          <a:latin typeface="SimHei"/>
+                          <a:ea typeface="SimHei"/>
+                          <a:cs typeface="SimHei"/>
+                          <a:sym typeface="SimHei"/>
+                        </a:rPr>
+                        <a:t>，Serena</a:t>
                       </a:r>
                       <a:endParaRPr sz="2600" dirty="0">
                         <a:solidFill>
@@ -23114,15 +23126,7 @@
           </a:bodyPr>
           <a:lstStyle/>
           <a:p>
-            <a:pPr marL="0" lvl="0" indent="0" algn="ctr" rtl="0">
-              <a:spcBef>
-                <a:spcPts val="0"/>
-              </a:spcBef>
-              <a:spcAft>
-                <a:spcPts val="0"/>
-              </a:spcAft>
-              <a:buNone/>
-            </a:pPr>
+            <a:pPr lvl="0"/>
             <a:r>
               <a:rPr lang="en" dirty="0" err="1"/>
               <a:t>证</a:t>
@@ -23151,8 +23155,8 @@
         </p:nvSpPr>
         <p:spPr>
           <a:xfrm>
-            <a:off x="1061125" y="2057400"/>
-            <a:ext cx="7100400" cy="1597500"/>
+            <a:off x="1061125" y="2057399"/>
+            <a:ext cx="7100400" cy="2121064"/>
           </a:xfrm>
           <a:prstGeom prst="rect">
             <a:avLst/>
@@ -23160,20 +23164,40 @@
         </p:spPr>
         <p:txBody>
           <a:bodyPr spcFirstLastPara="1" wrap="square" lIns="91425" tIns="91425" rIns="91425" bIns="91425" anchor="ctr" anchorCtr="0">
-            <a:noAutofit/>
+            <a:normAutofit/>
           </a:bodyPr>
           <a:lstStyle/>
           <a:p>
-            <a:pPr marL="0" lvl="0" indent="0" algn="ctr" rtl="0">
-              <a:spcBef>
-                <a:spcPts val="0"/>
-              </a:spcBef>
-              <a:spcAft>
-                <a:spcPts val="0"/>
-              </a:spcAft>
-              <a:buNone/>
-            </a:pPr>
-            <a:endParaRPr dirty="0"/>
+            <a:pPr marL="0" lvl="0" indent="0"/>
+            <a:r>
+              <a:rPr lang="zh-CN" altLang="en-US" dirty="0"/>
+              <a:t>主题</a:t>
+            </a:r>
+            <a:endParaRPr lang="en-CA" altLang="zh-CN" dirty="0"/>
+          </a:p>
+          <a:p>
+            <a:pPr marL="0" lvl="0" indent="0"/>
+            <a:r>
+              <a:rPr lang="en-CA" dirty="0"/>
+              <a:t>I. </a:t>
+            </a:r>
+            <a:r>
+              <a:rPr lang="en-CA" dirty="0" err="1"/>
+              <a:t>第一点</a:t>
+            </a:r>
+            <a:endParaRPr lang="zh-CN" altLang="en-US" dirty="0"/>
+          </a:p>
+          <a:p>
+            <a:pPr marL="0" lvl="0" indent="0"/>
+            <a:r>
+              <a:rPr lang="en-CA" dirty="0"/>
+              <a:t>II. </a:t>
+            </a:r>
+            <a:r>
+              <a:rPr lang="en-CA" dirty="0" err="1"/>
+              <a:t>第二点</a:t>
+            </a:r>
+            <a:endParaRPr lang="zh-CN" altLang="en-US" dirty="0"/>
           </a:p>
         </p:txBody>
       </p:sp>

</xml_diff>

<commit_message>
pass ppt backend error to frontend and show in sider bar
</commit_message>
<xml_diff>
--- a/templates/worship.pptx
+++ b/templates/worship.pptx
@@ -6,7 +6,7 @@
     <p:sldMasterId id="2147483688" r:id="rId2"/>
   </p:sldMasterIdLst>
   <p:notesMasterIdLst>
-    <p:notesMasterId r:id="rId21"/>
+    <p:notesMasterId r:id="rId23"/>
   </p:notesMasterIdLst>
   <p:sldIdLst>
     <p:sldId id="256" r:id="rId3"/>
@@ -23,36 +23,38 @@
     <p:sldId id="278" r:id="rId14"/>
     <p:sldId id="283" r:id="rId15"/>
     <p:sldId id="287" r:id="rId16"/>
-    <p:sldId id="290" r:id="rId17"/>
-    <p:sldId id="294" r:id="rId18"/>
-    <p:sldId id="295" r:id="rId19"/>
-    <p:sldId id="296" r:id="rId20"/>
+    <p:sldId id="288" r:id="rId17"/>
+    <p:sldId id="321" r:id="rId18"/>
+    <p:sldId id="290" r:id="rId19"/>
+    <p:sldId id="294" r:id="rId20"/>
+    <p:sldId id="295" r:id="rId21"/>
+    <p:sldId id="296" r:id="rId22"/>
   </p:sldIdLst>
   <p:sldSz cx="9144000" cy="5148263"/>
   <p:notesSz cx="6858000" cy="9144000"/>
   <p:embeddedFontLst>
     <p:embeddedFont>
       <p:font typeface="Calibri" panose="020F0502020204030204" pitchFamily="34" charset="0"/>
-      <p:regular r:id="rId22"/>
-      <p:bold r:id="rId23"/>
-      <p:italic r:id="rId24"/>
-      <p:boldItalic r:id="rId25"/>
+      <p:regular r:id="rId24"/>
+      <p:bold r:id="rId25"/>
+      <p:italic r:id="rId26"/>
+      <p:boldItalic r:id="rId27"/>
     </p:embeddedFont>
     <p:embeddedFont>
       <p:font typeface="Microsoft Yahei" panose="020B0503020204020204" pitchFamily="34" charset="-122"/>
-      <p:regular r:id="rId26"/>
-      <p:bold r:id="rId27"/>
+      <p:regular r:id="rId28"/>
+      <p:bold r:id="rId29"/>
     </p:embeddedFont>
     <p:embeddedFont>
       <p:font typeface="Roboto" panose="02000000000000000000" pitchFamily="2" charset="0"/>
-      <p:regular r:id="rId28"/>
-      <p:bold r:id="rId29"/>
-      <p:italic r:id="rId30"/>
-      <p:boldItalic r:id="rId31"/>
+      <p:regular r:id="rId30"/>
+      <p:bold r:id="rId31"/>
+      <p:italic r:id="rId32"/>
+      <p:boldItalic r:id="rId33"/>
     </p:embeddedFont>
     <p:embeddedFont>
       <p:font typeface="SimHei" panose="02010609060101010101" pitchFamily="49" charset="-122"/>
-      <p:regular r:id="rId32"/>
+      <p:regular r:id="rId34"/>
     </p:embeddedFont>
   </p:embeddedFontLst>
   <p:defaultTextStyle>
@@ -1373,6 +1375,219 @@
   <p:cSld>
     <p:spTree>
       <p:nvGrpSpPr>
+        <p:cNvPr id="1" name="Shape 434"/>
+        <p:cNvGrpSpPr/>
+        <p:nvPr/>
+      </p:nvGrpSpPr>
+      <p:grpSpPr>
+        <a:xfrm>
+          <a:off x="0" y="0"/>
+          <a:ext cx="0" cy="0"/>
+          <a:chOff x="0" y="0"/>
+          <a:chExt cx="0" cy="0"/>
+        </a:xfrm>
+      </p:grpSpPr>
+      <p:sp>
+        <p:nvSpPr>
+          <p:cNvPr id="435" name="Google Shape;435;gde9f79aa17_8_7:notes"/>
+          <p:cNvSpPr>
+            <a:spLocks noGrp="1" noRot="1" noChangeAspect="1"/>
+          </p:cNvSpPr>
+          <p:nvPr>
+            <p:ph type="sldImg" idx="2"/>
+          </p:nvPr>
+        </p:nvSpPr>
+        <p:spPr>
+          <a:xfrm>
+            <a:off x="384175" y="685800"/>
+            <a:ext cx="6089650" cy="3429000"/>
+          </a:xfrm>
+          <a:custGeom>
+            <a:avLst/>
+            <a:gdLst/>
+            <a:ahLst/>
+            <a:cxnLst/>
+            <a:rect l="l" t="t" r="r" b="b"/>
+            <a:pathLst>
+              <a:path w="120000" h="120000" extrusionOk="0">
+                <a:moveTo>
+                  <a:pt x="0" y="0"/>
+                </a:moveTo>
+                <a:lnTo>
+                  <a:pt x="120000" y="0"/>
+                </a:lnTo>
+                <a:lnTo>
+                  <a:pt x="120000" y="120000"/>
+                </a:lnTo>
+                <a:lnTo>
+                  <a:pt x="0" y="120000"/>
+                </a:lnTo>
+                <a:close/>
+              </a:path>
+            </a:pathLst>
+          </a:custGeom>
+        </p:spPr>
+      </p:sp>
+      <p:sp>
+        <p:nvSpPr>
+          <p:cNvPr id="436" name="Google Shape;436;gde9f79aa17_8_7:notes"/>
+          <p:cNvSpPr txBox="1">
+            <a:spLocks noGrp="1"/>
+          </p:cNvSpPr>
+          <p:nvPr>
+            <p:ph type="body" idx="1"/>
+          </p:nvPr>
+        </p:nvSpPr>
+        <p:spPr>
+          <a:xfrm>
+            <a:off x="685800" y="4343400"/>
+            <a:ext cx="5486400" cy="4114800"/>
+          </a:xfrm>
+          <a:prstGeom prst="rect">
+            <a:avLst/>
+          </a:prstGeom>
+        </p:spPr>
+        <p:txBody>
+          <a:bodyPr spcFirstLastPara="1" wrap="square" lIns="91425" tIns="91425" rIns="91425" bIns="91425" anchor="t" anchorCtr="0">
+            <a:noAutofit/>
+          </a:bodyPr>
+          <a:lstStyle/>
+          <a:p>
+            <a:pPr marL="0" lvl="0" indent="0" algn="l" rtl="0">
+              <a:spcBef>
+                <a:spcPts val="0"/>
+              </a:spcBef>
+              <a:spcAft>
+                <a:spcPts val="0"/>
+              </a:spcAft>
+              <a:buNone/>
+            </a:pPr>
+            <a:endParaRPr/>
+          </a:p>
+        </p:txBody>
+      </p:sp>
+    </p:spTree>
+  </p:cSld>
+  <p:clrMapOvr>
+    <a:masterClrMapping/>
+  </p:clrMapOvr>
+</p:notes>
+</file>
+
+<file path=ppt/notesSlides/notesSlide16.xml><?xml version="1.0" encoding="utf-8"?>
+<p:notes xmlns:a="http://schemas.openxmlformats.org/drawingml/2006/main" xmlns:r="http://schemas.openxmlformats.org/officeDocument/2006/relationships" xmlns:p="http://schemas.openxmlformats.org/presentationml/2006/main" showMasterSp="0" showMasterPhAnim="0">
+  <p:cSld>
+    <p:spTree>
+      <p:nvGrpSpPr>
+        <p:cNvPr id="1" name="Shape 434"/>
+        <p:cNvGrpSpPr/>
+        <p:nvPr/>
+      </p:nvGrpSpPr>
+      <p:grpSpPr>
+        <a:xfrm>
+          <a:off x="0" y="0"/>
+          <a:ext cx="0" cy="0"/>
+          <a:chOff x="0" y="0"/>
+          <a:chExt cx="0" cy="0"/>
+        </a:xfrm>
+      </p:grpSpPr>
+      <p:sp>
+        <p:nvSpPr>
+          <p:cNvPr id="435" name="Google Shape;435;gde9f79aa17_8_7:notes"/>
+          <p:cNvSpPr>
+            <a:spLocks noGrp="1" noRot="1" noChangeAspect="1"/>
+          </p:cNvSpPr>
+          <p:nvPr>
+            <p:ph type="sldImg" idx="2"/>
+          </p:nvPr>
+        </p:nvSpPr>
+        <p:spPr>
+          <a:xfrm>
+            <a:off x="384175" y="685800"/>
+            <a:ext cx="6089650" cy="3429000"/>
+          </a:xfrm>
+          <a:custGeom>
+            <a:avLst/>
+            <a:gdLst/>
+            <a:ahLst/>
+            <a:cxnLst/>
+            <a:rect l="l" t="t" r="r" b="b"/>
+            <a:pathLst>
+              <a:path w="120000" h="120000" extrusionOk="0">
+                <a:moveTo>
+                  <a:pt x="0" y="0"/>
+                </a:moveTo>
+                <a:lnTo>
+                  <a:pt x="120000" y="0"/>
+                </a:lnTo>
+                <a:lnTo>
+                  <a:pt x="120000" y="120000"/>
+                </a:lnTo>
+                <a:lnTo>
+                  <a:pt x="0" y="120000"/>
+                </a:lnTo>
+                <a:close/>
+              </a:path>
+            </a:pathLst>
+          </a:custGeom>
+        </p:spPr>
+      </p:sp>
+      <p:sp>
+        <p:nvSpPr>
+          <p:cNvPr id="436" name="Google Shape;436;gde9f79aa17_8_7:notes"/>
+          <p:cNvSpPr txBox="1">
+            <a:spLocks noGrp="1"/>
+          </p:cNvSpPr>
+          <p:nvPr>
+            <p:ph type="body" idx="1"/>
+          </p:nvPr>
+        </p:nvSpPr>
+        <p:spPr>
+          <a:xfrm>
+            <a:off x="685800" y="4343400"/>
+            <a:ext cx="5486400" cy="4114800"/>
+          </a:xfrm>
+          <a:prstGeom prst="rect">
+            <a:avLst/>
+          </a:prstGeom>
+        </p:spPr>
+        <p:txBody>
+          <a:bodyPr spcFirstLastPara="1" wrap="square" lIns="91425" tIns="91425" rIns="91425" bIns="91425" anchor="t" anchorCtr="0">
+            <a:noAutofit/>
+          </a:bodyPr>
+          <a:lstStyle/>
+          <a:p>
+            <a:pPr marL="0" lvl="0" indent="0" algn="l" rtl="0">
+              <a:spcBef>
+                <a:spcPts val="0"/>
+              </a:spcBef>
+              <a:spcAft>
+                <a:spcPts val="0"/>
+              </a:spcAft>
+              <a:buNone/>
+            </a:pPr>
+            <a:endParaRPr/>
+          </a:p>
+        </p:txBody>
+      </p:sp>
+    </p:spTree>
+    <p:extLst>
+      <p:ext uri="{BB962C8B-B14F-4D97-AF65-F5344CB8AC3E}">
+        <p14:creationId xmlns:p14="http://schemas.microsoft.com/office/powerpoint/2010/main" val="786777894"/>
+      </p:ext>
+    </p:extLst>
+  </p:cSld>
+  <p:clrMapOvr>
+    <a:masterClrMapping/>
+  </p:clrMapOvr>
+</p:notes>
+</file>
+
+<file path=ppt/notesSlides/notesSlide17.xml><?xml version="1.0" encoding="utf-8"?>
+<p:notes xmlns:a="http://schemas.openxmlformats.org/drawingml/2006/main" xmlns:r="http://schemas.openxmlformats.org/officeDocument/2006/relationships" xmlns:p="http://schemas.openxmlformats.org/presentationml/2006/main" showMasterSp="0" showMasterPhAnim="0">
+  <p:cSld>
+    <p:spTree>
+      <p:nvGrpSpPr>
         <p:cNvPr id="1" name="Shape 448"/>
         <p:cNvGrpSpPr/>
         <p:nvPr/>
@@ -1472,7 +1687,7 @@
 </p:notes>
 </file>
 
-<file path=ppt/notesSlides/notesSlide16.xml><?xml version="1.0" encoding="utf-8"?>
+<file path=ppt/notesSlides/notesSlide18.xml><?xml version="1.0" encoding="utf-8"?>
 <p:notes xmlns:a="http://schemas.openxmlformats.org/drawingml/2006/main" xmlns:r="http://schemas.openxmlformats.org/officeDocument/2006/relationships" xmlns:p="http://schemas.openxmlformats.org/presentationml/2006/main" showMasterSp="0" showMasterPhAnim="0">
   <p:cSld>
     <p:spTree>
@@ -1576,7 +1791,7 @@
 </p:notes>
 </file>
 
-<file path=ppt/notesSlides/notesSlide17.xml><?xml version="1.0" encoding="utf-8"?>
+<file path=ppt/notesSlides/notesSlide19.xml><?xml version="1.0" encoding="utf-8"?>
 <p:notes xmlns:a="http://schemas.openxmlformats.org/drawingml/2006/main" xmlns:r="http://schemas.openxmlformats.org/officeDocument/2006/relationships" xmlns:p="http://schemas.openxmlformats.org/presentationml/2006/main" showMasterSp="0" showMasterPhAnim="0">
   <p:cSld>
     <p:spTree>
@@ -1671,110 +1886,6 @@
             </a:pathLst>
           </a:custGeom>
         </p:spPr>
-      </p:sp>
-    </p:spTree>
-  </p:cSld>
-  <p:clrMapOvr>
-    <a:masterClrMapping/>
-  </p:clrMapOvr>
-</p:notes>
-</file>
-
-<file path=ppt/notesSlides/notesSlide18.xml><?xml version="1.0" encoding="utf-8"?>
-<p:notes xmlns:a="http://schemas.openxmlformats.org/drawingml/2006/main" xmlns:r="http://schemas.openxmlformats.org/officeDocument/2006/relationships" xmlns:p="http://schemas.openxmlformats.org/presentationml/2006/main" showMasterSp="0" showMasterPhAnim="0">
-  <p:cSld>
-    <p:spTree>
-      <p:nvGrpSpPr>
-        <p:cNvPr id="1" name="Shape 495"/>
-        <p:cNvGrpSpPr/>
-        <p:nvPr/>
-      </p:nvGrpSpPr>
-      <p:grpSpPr>
-        <a:xfrm>
-          <a:off x="0" y="0"/>
-          <a:ext cx="0" cy="0"/>
-          <a:chOff x="0" y="0"/>
-          <a:chExt cx="0" cy="0"/>
-        </a:xfrm>
-      </p:grpSpPr>
-      <p:sp>
-        <p:nvSpPr>
-          <p:cNvPr id="496" name="Google Shape;496;gde9f79aa17_7_929:notes"/>
-          <p:cNvSpPr>
-            <a:spLocks noGrp="1" noRot="1" noChangeAspect="1"/>
-          </p:cNvSpPr>
-          <p:nvPr>
-            <p:ph type="sldImg" idx="2"/>
-          </p:nvPr>
-        </p:nvSpPr>
-        <p:spPr>
-          <a:xfrm>
-            <a:off x="384175" y="685800"/>
-            <a:ext cx="6089650" cy="3429000"/>
-          </a:xfrm>
-          <a:custGeom>
-            <a:avLst/>
-            <a:gdLst/>
-            <a:ahLst/>
-            <a:cxnLst/>
-            <a:rect l="l" t="t" r="r" b="b"/>
-            <a:pathLst>
-              <a:path w="120000" h="120000" extrusionOk="0">
-                <a:moveTo>
-                  <a:pt x="0" y="0"/>
-                </a:moveTo>
-                <a:lnTo>
-                  <a:pt x="120000" y="0"/>
-                </a:lnTo>
-                <a:lnTo>
-                  <a:pt x="120000" y="120000"/>
-                </a:lnTo>
-                <a:lnTo>
-                  <a:pt x="0" y="120000"/>
-                </a:lnTo>
-                <a:close/>
-              </a:path>
-            </a:pathLst>
-          </a:custGeom>
-        </p:spPr>
-      </p:sp>
-      <p:sp>
-        <p:nvSpPr>
-          <p:cNvPr id="497" name="Google Shape;497;gde9f79aa17_7_929:notes"/>
-          <p:cNvSpPr txBox="1">
-            <a:spLocks noGrp="1"/>
-          </p:cNvSpPr>
-          <p:nvPr>
-            <p:ph type="body" idx="1"/>
-          </p:nvPr>
-        </p:nvSpPr>
-        <p:spPr>
-          <a:xfrm>
-            <a:off x="685800" y="4343400"/>
-            <a:ext cx="5486400" cy="4114800"/>
-          </a:xfrm>
-          <a:prstGeom prst="rect">
-            <a:avLst/>
-          </a:prstGeom>
-        </p:spPr>
-        <p:txBody>
-          <a:bodyPr spcFirstLastPara="1" wrap="square" lIns="91425" tIns="91425" rIns="91425" bIns="91425" anchor="t" anchorCtr="0">
-            <a:noAutofit/>
-          </a:bodyPr>
-          <a:lstStyle/>
-          <a:p>
-            <a:pPr marL="0" lvl="0" indent="0" algn="l" rtl="0">
-              <a:spcBef>
-                <a:spcPts val="0"/>
-              </a:spcBef>
-              <a:spcAft>
-                <a:spcPts val="0"/>
-              </a:spcAft>
-              <a:buNone/>
-            </a:pPr>
-            <a:endParaRPr/>
-          </a:p>
-        </p:txBody>
       </p:sp>
     </p:spTree>
   </p:cSld>
@@ -1845,6 +1956,110 @@
       <p:sp>
         <p:nvSpPr>
           <p:cNvPr id="201" name="Google Shape;201;gde9f79aa17_7_824:notes"/>
+          <p:cNvSpPr txBox="1">
+            <a:spLocks noGrp="1"/>
+          </p:cNvSpPr>
+          <p:nvPr>
+            <p:ph type="body" idx="1"/>
+          </p:nvPr>
+        </p:nvSpPr>
+        <p:spPr>
+          <a:xfrm>
+            <a:off x="685800" y="4343400"/>
+            <a:ext cx="5486400" cy="4114800"/>
+          </a:xfrm>
+          <a:prstGeom prst="rect">
+            <a:avLst/>
+          </a:prstGeom>
+        </p:spPr>
+        <p:txBody>
+          <a:bodyPr spcFirstLastPara="1" wrap="square" lIns="91425" tIns="91425" rIns="91425" bIns="91425" anchor="t" anchorCtr="0">
+            <a:noAutofit/>
+          </a:bodyPr>
+          <a:lstStyle/>
+          <a:p>
+            <a:pPr marL="0" lvl="0" indent="0" algn="l" rtl="0">
+              <a:spcBef>
+                <a:spcPts val="0"/>
+              </a:spcBef>
+              <a:spcAft>
+                <a:spcPts val="0"/>
+              </a:spcAft>
+              <a:buNone/>
+            </a:pPr>
+            <a:endParaRPr/>
+          </a:p>
+        </p:txBody>
+      </p:sp>
+    </p:spTree>
+  </p:cSld>
+  <p:clrMapOvr>
+    <a:masterClrMapping/>
+  </p:clrMapOvr>
+</p:notes>
+</file>
+
+<file path=ppt/notesSlides/notesSlide20.xml><?xml version="1.0" encoding="utf-8"?>
+<p:notes xmlns:a="http://schemas.openxmlformats.org/drawingml/2006/main" xmlns:r="http://schemas.openxmlformats.org/officeDocument/2006/relationships" xmlns:p="http://schemas.openxmlformats.org/presentationml/2006/main" showMasterSp="0" showMasterPhAnim="0">
+  <p:cSld>
+    <p:spTree>
+      <p:nvGrpSpPr>
+        <p:cNvPr id="1" name="Shape 495"/>
+        <p:cNvGrpSpPr/>
+        <p:nvPr/>
+      </p:nvGrpSpPr>
+      <p:grpSpPr>
+        <a:xfrm>
+          <a:off x="0" y="0"/>
+          <a:ext cx="0" cy="0"/>
+          <a:chOff x="0" y="0"/>
+          <a:chExt cx="0" cy="0"/>
+        </a:xfrm>
+      </p:grpSpPr>
+      <p:sp>
+        <p:nvSpPr>
+          <p:cNvPr id="496" name="Google Shape;496;gde9f79aa17_7_929:notes"/>
+          <p:cNvSpPr>
+            <a:spLocks noGrp="1" noRot="1" noChangeAspect="1"/>
+          </p:cNvSpPr>
+          <p:nvPr>
+            <p:ph type="sldImg" idx="2"/>
+          </p:nvPr>
+        </p:nvSpPr>
+        <p:spPr>
+          <a:xfrm>
+            <a:off x="384175" y="685800"/>
+            <a:ext cx="6089650" cy="3429000"/>
+          </a:xfrm>
+          <a:custGeom>
+            <a:avLst/>
+            <a:gdLst/>
+            <a:ahLst/>
+            <a:cxnLst/>
+            <a:rect l="l" t="t" r="r" b="b"/>
+            <a:pathLst>
+              <a:path w="120000" h="120000" extrusionOk="0">
+                <a:moveTo>
+                  <a:pt x="0" y="0"/>
+                </a:moveTo>
+                <a:lnTo>
+                  <a:pt x="120000" y="0"/>
+                </a:lnTo>
+                <a:lnTo>
+                  <a:pt x="120000" y="120000"/>
+                </a:lnTo>
+                <a:lnTo>
+                  <a:pt x="0" y="120000"/>
+                </a:lnTo>
+                <a:close/>
+              </a:path>
+            </a:pathLst>
+          </a:custGeom>
+        </p:spPr>
+      </p:sp>
+      <p:sp>
+        <p:nvSpPr>
+          <p:cNvPr id="497" name="Google Shape;497;gde9f79aa17_7_929:notes"/>
           <p:cNvSpPr txBox="1">
             <a:spLocks noGrp="1"/>
           </p:cNvSpPr>
@@ -11160,6 +11375,605 @@
   <p:clrMapOvr>
     <a:masterClrMapping/>
   </p:clrMapOvr>
+</p:sldLayout>
+</file>
+
+<file path=ppt/slideLayouts/slideLayout27.xml><?xml version="1.0" encoding="utf-8"?>
+<p:sldLayout xmlns:a="http://schemas.openxmlformats.org/drawingml/2006/main" xmlns:r="http://schemas.openxmlformats.org/officeDocument/2006/relationships" xmlns:p="http://schemas.openxmlformats.org/presentationml/2006/main" matchingName="读经">
+  <p:cSld name="读经">
+    <p:spTree>
+      <p:nvGrpSpPr>
+        <p:cNvPr id="1" name="Shape 154"/>
+        <p:cNvGrpSpPr/>
+        <p:nvPr/>
+      </p:nvGrpSpPr>
+      <p:grpSpPr>
+        <a:xfrm>
+          <a:off x="0" y="0"/>
+          <a:ext cx="0" cy="0"/>
+          <a:chOff x="0" y="0"/>
+          <a:chExt cx="0" cy="0"/>
+        </a:xfrm>
+      </p:grpSpPr>
+      <p:sp>
+        <p:nvSpPr>
+          <p:cNvPr id="155" name="Google Shape;155;p31"/>
+          <p:cNvSpPr txBox="1">
+            <a:spLocks noGrp="1"/>
+          </p:cNvSpPr>
+          <p:nvPr>
+            <p:ph type="title"/>
+          </p:nvPr>
+        </p:nvSpPr>
+        <p:spPr>
+          <a:xfrm>
+            <a:off x="311700" y="199650"/>
+            <a:ext cx="5424900" cy="393600"/>
+          </a:xfrm>
+          <a:prstGeom prst="rect">
+            <a:avLst/>
+          </a:prstGeom>
+        </p:spPr>
+        <p:txBody>
+          <a:bodyPr spcFirstLastPara="1" wrap="square" lIns="91425" tIns="91425" rIns="91425" bIns="91425" anchor="t" anchorCtr="0">
+            <a:noAutofit/>
+          </a:bodyPr>
+          <a:lstStyle>
+            <a:lvl1pPr lvl="0" rtl="0">
+              <a:spcBef>
+                <a:spcPts val="0"/>
+              </a:spcBef>
+              <a:spcAft>
+                <a:spcPts val="0"/>
+              </a:spcAft>
+              <a:buSzPts val="1600"/>
+              <a:buNone/>
+              <a:defRPr sz="1600"/>
+            </a:lvl1pPr>
+            <a:lvl2pPr lvl="1" rtl="0">
+              <a:spcBef>
+                <a:spcPts val="0"/>
+              </a:spcBef>
+              <a:spcAft>
+                <a:spcPts val="0"/>
+              </a:spcAft>
+              <a:buSzPts val="1600"/>
+              <a:buNone/>
+              <a:defRPr sz="1600" b="1"/>
+            </a:lvl2pPr>
+            <a:lvl3pPr lvl="2" rtl="0">
+              <a:spcBef>
+                <a:spcPts val="0"/>
+              </a:spcBef>
+              <a:spcAft>
+                <a:spcPts val="0"/>
+              </a:spcAft>
+              <a:buSzPts val="1600"/>
+              <a:buNone/>
+              <a:defRPr sz="1600" b="1"/>
+            </a:lvl3pPr>
+            <a:lvl4pPr lvl="3" rtl="0">
+              <a:spcBef>
+                <a:spcPts val="0"/>
+              </a:spcBef>
+              <a:spcAft>
+                <a:spcPts val="0"/>
+              </a:spcAft>
+              <a:buSzPts val="1600"/>
+              <a:buNone/>
+              <a:defRPr sz="1600" b="1"/>
+            </a:lvl4pPr>
+            <a:lvl5pPr lvl="4" rtl="0">
+              <a:spcBef>
+                <a:spcPts val="0"/>
+              </a:spcBef>
+              <a:spcAft>
+                <a:spcPts val="0"/>
+              </a:spcAft>
+              <a:buSzPts val="1600"/>
+              <a:buNone/>
+              <a:defRPr sz="1600" b="1"/>
+            </a:lvl5pPr>
+            <a:lvl6pPr lvl="5" rtl="0">
+              <a:spcBef>
+                <a:spcPts val="0"/>
+              </a:spcBef>
+              <a:spcAft>
+                <a:spcPts val="0"/>
+              </a:spcAft>
+              <a:buSzPts val="1600"/>
+              <a:buNone/>
+              <a:defRPr sz="1600" b="1"/>
+            </a:lvl6pPr>
+            <a:lvl7pPr lvl="6" rtl="0">
+              <a:spcBef>
+                <a:spcPts val="0"/>
+              </a:spcBef>
+              <a:spcAft>
+                <a:spcPts val="0"/>
+              </a:spcAft>
+              <a:buSzPts val="1600"/>
+              <a:buNone/>
+              <a:defRPr sz="1600" b="1"/>
+            </a:lvl7pPr>
+            <a:lvl8pPr lvl="7" rtl="0">
+              <a:spcBef>
+                <a:spcPts val="0"/>
+              </a:spcBef>
+              <a:spcAft>
+                <a:spcPts val="0"/>
+              </a:spcAft>
+              <a:buSzPts val="1600"/>
+              <a:buNone/>
+              <a:defRPr sz="1600" b="1"/>
+            </a:lvl8pPr>
+            <a:lvl9pPr lvl="8" rtl="0">
+              <a:spcBef>
+                <a:spcPts val="0"/>
+              </a:spcBef>
+              <a:spcAft>
+                <a:spcPts val="0"/>
+              </a:spcAft>
+              <a:buSzPts val="1600"/>
+              <a:buNone/>
+              <a:defRPr sz="1600" b="1"/>
+            </a:lvl9pPr>
+          </a:lstStyle>
+          <a:p>
+            <a:endParaRPr/>
+          </a:p>
+        </p:txBody>
+      </p:sp>
+      <p:sp>
+        <p:nvSpPr>
+          <p:cNvPr id="156" name="Google Shape;156;p31"/>
+          <p:cNvSpPr txBox="1">
+            <a:spLocks noGrp="1"/>
+          </p:cNvSpPr>
+          <p:nvPr>
+            <p:ph type="body" idx="1"/>
+          </p:nvPr>
+        </p:nvSpPr>
+        <p:spPr>
+          <a:xfrm>
+            <a:off x="311700" y="866775"/>
+            <a:ext cx="8520600" cy="3563700"/>
+          </a:xfrm>
+          <a:prstGeom prst="rect">
+            <a:avLst/>
+          </a:prstGeom>
+        </p:spPr>
+        <p:txBody>
+          <a:bodyPr spcFirstLastPara="1" wrap="square" lIns="91425" tIns="91425" rIns="91425" bIns="91425" anchor="t" anchorCtr="0">
+            <a:noAutofit/>
+          </a:bodyPr>
+          <a:lstStyle>
+            <a:lvl1pPr marL="457200" lvl="0" indent="-393700" rtl="0">
+              <a:lnSpc>
+                <a:spcPct val="150000"/>
+              </a:lnSpc>
+              <a:spcBef>
+                <a:spcPts val="0"/>
+              </a:spcBef>
+              <a:spcAft>
+                <a:spcPts val="0"/>
+              </a:spcAft>
+              <a:buClr>
+                <a:srgbClr val="FFFFFF"/>
+              </a:buClr>
+              <a:buSzPts val="2600"/>
+              <a:buFont typeface="Microsoft Yahei"/>
+              <a:buChar char="●"/>
+              <a:defRPr sz="2600">
+                <a:solidFill>
+                  <a:srgbClr val="FFFFFF"/>
+                </a:solidFill>
+                <a:latin typeface="Microsoft Yahei"/>
+                <a:ea typeface="Microsoft Yahei"/>
+                <a:cs typeface="Microsoft Yahei"/>
+                <a:sym typeface="Microsoft Yahei"/>
+              </a:defRPr>
+            </a:lvl1pPr>
+            <a:lvl2pPr marL="914400" lvl="1" indent="-381000" rtl="0">
+              <a:lnSpc>
+                <a:spcPct val="150000"/>
+              </a:lnSpc>
+              <a:spcBef>
+                <a:spcPts val="1600"/>
+              </a:spcBef>
+              <a:spcAft>
+                <a:spcPts val="0"/>
+              </a:spcAft>
+              <a:buClr>
+                <a:srgbClr val="FFFFFF"/>
+              </a:buClr>
+              <a:buSzPts val="2400"/>
+              <a:buFont typeface="Microsoft Yahei"/>
+              <a:buChar char="○"/>
+              <a:defRPr sz="2400">
+                <a:solidFill>
+                  <a:srgbClr val="FFFFFF"/>
+                </a:solidFill>
+                <a:latin typeface="Microsoft Yahei"/>
+                <a:ea typeface="Microsoft Yahei"/>
+                <a:cs typeface="Microsoft Yahei"/>
+                <a:sym typeface="Microsoft Yahei"/>
+              </a:defRPr>
+            </a:lvl2pPr>
+            <a:lvl3pPr marL="1371600" lvl="2" indent="-368300" rtl="0">
+              <a:lnSpc>
+                <a:spcPct val="150000"/>
+              </a:lnSpc>
+              <a:spcBef>
+                <a:spcPts val="1600"/>
+              </a:spcBef>
+              <a:spcAft>
+                <a:spcPts val="0"/>
+              </a:spcAft>
+              <a:buClr>
+                <a:srgbClr val="FFFFFF"/>
+              </a:buClr>
+              <a:buSzPts val="2200"/>
+              <a:buFont typeface="Microsoft Yahei"/>
+              <a:buChar char="■"/>
+              <a:defRPr sz="2200">
+                <a:solidFill>
+                  <a:srgbClr val="FFFFFF"/>
+                </a:solidFill>
+                <a:latin typeface="Microsoft Yahei"/>
+                <a:ea typeface="Microsoft Yahei"/>
+                <a:cs typeface="Microsoft Yahei"/>
+                <a:sym typeface="Microsoft Yahei"/>
+              </a:defRPr>
+            </a:lvl3pPr>
+            <a:lvl4pPr marL="1828800" lvl="3" indent="-355600" rtl="0">
+              <a:lnSpc>
+                <a:spcPct val="150000"/>
+              </a:lnSpc>
+              <a:spcBef>
+                <a:spcPts val="1600"/>
+              </a:spcBef>
+              <a:spcAft>
+                <a:spcPts val="0"/>
+              </a:spcAft>
+              <a:buClr>
+                <a:srgbClr val="FFFFFF"/>
+              </a:buClr>
+              <a:buSzPts val="2000"/>
+              <a:buFont typeface="Microsoft Yahei"/>
+              <a:buChar char="●"/>
+              <a:defRPr sz="2000">
+                <a:solidFill>
+                  <a:srgbClr val="FFFFFF"/>
+                </a:solidFill>
+                <a:latin typeface="Microsoft Yahei"/>
+                <a:ea typeface="Microsoft Yahei"/>
+                <a:cs typeface="Microsoft Yahei"/>
+                <a:sym typeface="Microsoft Yahei"/>
+              </a:defRPr>
+            </a:lvl4pPr>
+            <a:lvl5pPr marL="2286000" lvl="4" indent="-342900" rtl="0">
+              <a:lnSpc>
+                <a:spcPct val="150000"/>
+              </a:lnSpc>
+              <a:spcBef>
+                <a:spcPts val="1600"/>
+              </a:spcBef>
+              <a:spcAft>
+                <a:spcPts val="0"/>
+              </a:spcAft>
+              <a:buClr>
+                <a:srgbClr val="FFFFFF"/>
+              </a:buClr>
+              <a:buSzPts val="1800"/>
+              <a:buFont typeface="Microsoft Yahei"/>
+              <a:buChar char="○"/>
+              <a:defRPr sz="1800">
+                <a:solidFill>
+                  <a:srgbClr val="FFFFFF"/>
+                </a:solidFill>
+                <a:latin typeface="Microsoft Yahei"/>
+                <a:ea typeface="Microsoft Yahei"/>
+                <a:cs typeface="Microsoft Yahei"/>
+                <a:sym typeface="Microsoft Yahei"/>
+              </a:defRPr>
+            </a:lvl5pPr>
+            <a:lvl6pPr marL="2743200" lvl="5" indent="-330200" rtl="0">
+              <a:lnSpc>
+                <a:spcPct val="150000"/>
+              </a:lnSpc>
+              <a:spcBef>
+                <a:spcPts val="1600"/>
+              </a:spcBef>
+              <a:spcAft>
+                <a:spcPts val="0"/>
+              </a:spcAft>
+              <a:buClr>
+                <a:srgbClr val="FFFFFF"/>
+              </a:buClr>
+              <a:buSzPts val="1600"/>
+              <a:buFont typeface="Microsoft Yahei"/>
+              <a:buChar char="■"/>
+              <a:defRPr sz="1600">
+                <a:solidFill>
+                  <a:srgbClr val="FFFFFF"/>
+                </a:solidFill>
+                <a:latin typeface="Microsoft Yahei"/>
+                <a:ea typeface="Microsoft Yahei"/>
+                <a:cs typeface="Microsoft Yahei"/>
+                <a:sym typeface="Microsoft Yahei"/>
+              </a:defRPr>
+            </a:lvl6pPr>
+            <a:lvl7pPr marL="3200400" lvl="6" indent="-317500" rtl="0">
+              <a:lnSpc>
+                <a:spcPct val="150000"/>
+              </a:lnSpc>
+              <a:spcBef>
+                <a:spcPts val="1600"/>
+              </a:spcBef>
+              <a:spcAft>
+                <a:spcPts val="0"/>
+              </a:spcAft>
+              <a:buClr>
+                <a:srgbClr val="FFFFFF"/>
+              </a:buClr>
+              <a:buSzPts val="1400"/>
+              <a:buFont typeface="Microsoft Yahei"/>
+              <a:buChar char="●"/>
+              <a:defRPr>
+                <a:solidFill>
+                  <a:srgbClr val="FFFFFF"/>
+                </a:solidFill>
+                <a:latin typeface="Microsoft Yahei"/>
+                <a:ea typeface="Microsoft Yahei"/>
+                <a:cs typeface="Microsoft Yahei"/>
+                <a:sym typeface="Microsoft Yahei"/>
+              </a:defRPr>
+            </a:lvl7pPr>
+            <a:lvl8pPr marL="3657600" lvl="7" indent="-317500" rtl="0">
+              <a:lnSpc>
+                <a:spcPct val="150000"/>
+              </a:lnSpc>
+              <a:spcBef>
+                <a:spcPts val="1600"/>
+              </a:spcBef>
+              <a:spcAft>
+                <a:spcPts val="0"/>
+              </a:spcAft>
+              <a:buClr>
+                <a:srgbClr val="FFFFFF"/>
+              </a:buClr>
+              <a:buSzPts val="1400"/>
+              <a:buFont typeface="Microsoft Yahei"/>
+              <a:buChar char="○"/>
+              <a:defRPr>
+                <a:solidFill>
+                  <a:srgbClr val="FFFFFF"/>
+                </a:solidFill>
+                <a:latin typeface="Microsoft Yahei"/>
+                <a:ea typeface="Microsoft Yahei"/>
+                <a:cs typeface="Microsoft Yahei"/>
+                <a:sym typeface="Microsoft Yahei"/>
+              </a:defRPr>
+            </a:lvl8pPr>
+            <a:lvl9pPr marL="4114800" lvl="8" indent="-317500" rtl="0">
+              <a:lnSpc>
+                <a:spcPct val="150000"/>
+              </a:lnSpc>
+              <a:spcBef>
+                <a:spcPts val="1600"/>
+              </a:spcBef>
+              <a:spcAft>
+                <a:spcPts val="1600"/>
+              </a:spcAft>
+              <a:buClr>
+                <a:srgbClr val="FFFFFF"/>
+              </a:buClr>
+              <a:buSzPts val="1400"/>
+              <a:buFont typeface="Microsoft Yahei"/>
+              <a:buChar char="■"/>
+              <a:defRPr>
+                <a:solidFill>
+                  <a:srgbClr val="FFFFFF"/>
+                </a:solidFill>
+                <a:latin typeface="Microsoft Yahei"/>
+                <a:ea typeface="Microsoft Yahei"/>
+                <a:cs typeface="Microsoft Yahei"/>
+                <a:sym typeface="Microsoft Yahei"/>
+              </a:defRPr>
+            </a:lvl9pPr>
+          </a:lstStyle>
+          <a:p>
+            <a:endParaRPr/>
+          </a:p>
+        </p:txBody>
+      </p:sp>
+      <p:sp>
+        <p:nvSpPr>
+          <p:cNvPr id="157" name="Google Shape;157;p31"/>
+          <p:cNvSpPr txBox="1">
+            <a:spLocks noGrp="1"/>
+          </p:cNvSpPr>
+          <p:nvPr>
+            <p:ph type="title" idx="2"/>
+          </p:nvPr>
+        </p:nvSpPr>
+        <p:spPr>
+          <a:xfrm>
+            <a:off x="5643600" y="199650"/>
+            <a:ext cx="3188700" cy="393600"/>
+          </a:xfrm>
+          <a:prstGeom prst="rect">
+            <a:avLst/>
+          </a:prstGeom>
+        </p:spPr>
+        <p:txBody>
+          <a:bodyPr spcFirstLastPara="1" wrap="square" lIns="91425" tIns="91425" rIns="91425" bIns="91425" anchor="t" anchorCtr="0">
+            <a:noAutofit/>
+          </a:bodyPr>
+          <a:lstStyle>
+            <a:lvl1pPr lvl="0" algn="r" rtl="0">
+              <a:spcBef>
+                <a:spcPts val="0"/>
+              </a:spcBef>
+              <a:spcAft>
+                <a:spcPts val="0"/>
+              </a:spcAft>
+              <a:buSzPts val="1600"/>
+              <a:buNone/>
+              <a:defRPr sz="1600"/>
+            </a:lvl1pPr>
+            <a:lvl2pPr lvl="1" algn="r" rtl="0">
+              <a:spcBef>
+                <a:spcPts val="0"/>
+              </a:spcBef>
+              <a:spcAft>
+                <a:spcPts val="0"/>
+              </a:spcAft>
+              <a:buSzPts val="1600"/>
+              <a:buNone/>
+              <a:defRPr sz="1600" b="1"/>
+            </a:lvl2pPr>
+            <a:lvl3pPr lvl="2" algn="r" rtl="0">
+              <a:spcBef>
+                <a:spcPts val="0"/>
+              </a:spcBef>
+              <a:spcAft>
+                <a:spcPts val="0"/>
+              </a:spcAft>
+              <a:buSzPts val="1600"/>
+              <a:buNone/>
+              <a:defRPr sz="1600" b="1"/>
+            </a:lvl3pPr>
+            <a:lvl4pPr lvl="3" algn="r" rtl="0">
+              <a:spcBef>
+                <a:spcPts val="0"/>
+              </a:spcBef>
+              <a:spcAft>
+                <a:spcPts val="0"/>
+              </a:spcAft>
+              <a:buSzPts val="1600"/>
+              <a:buNone/>
+              <a:defRPr sz="1600" b="1"/>
+            </a:lvl4pPr>
+            <a:lvl5pPr lvl="4" algn="r" rtl="0">
+              <a:spcBef>
+                <a:spcPts val="0"/>
+              </a:spcBef>
+              <a:spcAft>
+                <a:spcPts val="0"/>
+              </a:spcAft>
+              <a:buSzPts val="1600"/>
+              <a:buNone/>
+              <a:defRPr sz="1600" b="1"/>
+            </a:lvl5pPr>
+            <a:lvl6pPr lvl="5" algn="r" rtl="0">
+              <a:spcBef>
+                <a:spcPts val="0"/>
+              </a:spcBef>
+              <a:spcAft>
+                <a:spcPts val="0"/>
+              </a:spcAft>
+              <a:buSzPts val="1600"/>
+              <a:buNone/>
+              <a:defRPr sz="1600" b="1"/>
+            </a:lvl6pPr>
+            <a:lvl7pPr lvl="6" algn="r" rtl="0">
+              <a:spcBef>
+                <a:spcPts val="0"/>
+              </a:spcBef>
+              <a:spcAft>
+                <a:spcPts val="0"/>
+              </a:spcAft>
+              <a:buSzPts val="1600"/>
+              <a:buNone/>
+              <a:defRPr sz="1600" b="1"/>
+            </a:lvl7pPr>
+            <a:lvl8pPr lvl="7" algn="r" rtl="0">
+              <a:spcBef>
+                <a:spcPts val="0"/>
+              </a:spcBef>
+              <a:spcAft>
+                <a:spcPts val="0"/>
+              </a:spcAft>
+              <a:buSzPts val="1600"/>
+              <a:buNone/>
+              <a:defRPr sz="1600" b="1"/>
+            </a:lvl8pPr>
+            <a:lvl9pPr lvl="8" algn="r" rtl="0">
+              <a:spcBef>
+                <a:spcPts val="0"/>
+              </a:spcBef>
+              <a:spcAft>
+                <a:spcPts val="0"/>
+              </a:spcAft>
+              <a:buSzPts val="1600"/>
+              <a:buNone/>
+              <a:defRPr sz="1600" b="1"/>
+            </a:lvl9pPr>
+          </a:lstStyle>
+          <a:p>
+            <a:endParaRPr/>
+          </a:p>
+        </p:txBody>
+      </p:sp>
+      <p:cxnSp>
+        <p:nvCxnSpPr>
+          <p:cNvPr id="158" name="Google Shape;158;p31"/>
+          <p:cNvCxnSpPr/>
+          <p:nvPr/>
+        </p:nvCxnSpPr>
+        <p:spPr>
+          <a:xfrm>
+            <a:off x="9525" y="685800"/>
+            <a:ext cx="9144000" cy="0"/>
+          </a:xfrm>
+          <a:prstGeom prst="straightConnector1">
+            <a:avLst/>
+          </a:prstGeom>
+          <a:noFill/>
+          <a:ln w="9525" cap="flat" cmpd="sng">
+            <a:solidFill>
+              <a:schemeClr val="dk2"/>
+            </a:solidFill>
+            <a:prstDash val="solid"/>
+            <a:round/>
+            <a:headEnd type="none" w="med" len="med"/>
+            <a:tailEnd type="none" w="med" len="med"/>
+          </a:ln>
+        </p:spPr>
+      </p:cxnSp>
+    </p:spTree>
+    <p:extLst>
+      <p:ext uri="{BB962C8B-B14F-4D97-AF65-F5344CB8AC3E}">
+        <p14:creationId xmlns:p14="http://schemas.microsoft.com/office/powerpoint/2010/main" val="1606438657"/>
+      </p:ext>
+    </p:extLst>
+  </p:cSld>
+  <p:clrMapOvr>
+    <a:masterClrMapping/>
+  </p:clrMapOvr>
+  <p:extLst>
+    <p:ext uri="{DCECCB84-F9BA-43D5-87BE-67443E8EF086}">
+      <p15:sldGuideLst xmlns:p15="http://schemas.microsoft.com/office/powerpoint/2012/main">
+        <p15:guide id="1" orient="horz" pos="454">
+          <p15:clr>
+            <a:srgbClr val="FA7B17"/>
+          </p15:clr>
+        </p15:guide>
+        <p15:guide id="2" pos="2880">
+          <p15:clr>
+            <a:srgbClr val="FA7B17"/>
+          </p15:clr>
+        </p15:guide>
+        <p15:guide id="3" orient="horz" pos="307">
+          <p15:clr>
+            <a:srgbClr val="FA7B17"/>
+          </p15:clr>
+        </p15:guide>
+      </p15:sldGuideLst>
+    </p:ext>
+  </p:extLst>
 </p:sldLayout>
 </file>
 
@@ -19302,6 +20116,7 @@
     <p:sldLayoutId id="2147483683" r:id="rId13"/>
     <p:sldLayoutId id="2147483684" r:id="rId14"/>
     <p:sldLayoutId id="2147483685" r:id="rId15"/>
+    <p:sldLayoutId id="2147483689" r:id="rId16"/>
   </p:sldLayoutIdLst>
   <mc:AlternateContent xmlns:mc="http://schemas.openxmlformats.org/markup-compatibility/2006" xmlns:p14="http://schemas.microsoft.com/office/powerpoint/2010/main">
     <mc:Choice Requires="p14">
@@ -19309,7 +20124,7 @@
         <p:fade/>
       </p:transition>
     </mc:Choice>
-    <mc:Fallback xmlns="" xmlns:mv="urn:schemas-microsoft-com:mac:vml" xmlns:c="http://schemas.openxmlformats.org/drawingml/2006/chart" xmlns:dgm="http://schemas.openxmlformats.org/drawingml/2006/diagram" xmlns:o="urn:schemas-microsoft-com:office:office" xmlns:v="urn:schemas-microsoft-com:vml" xmlns:pvml="urn:schemas-microsoft-com:office:powerpoint" xmlns:com="http://schemas.openxmlformats.org/drawingml/2006/compatibility" xmlns:p15="http://schemas.microsoft.com/office/powerpoint/2012/main" xmlns:ahyp="http://schemas.microsoft.com/office/drawing/2018/hyperlinkcolor">
+    <mc:Fallback xmlns:ahyp="http://schemas.microsoft.com/office/drawing/2018/hyperlinkcolor" xmlns:p15="http://schemas.microsoft.com/office/powerpoint/2012/main" xmlns:com="http://schemas.openxmlformats.org/drawingml/2006/compatibility" xmlns:pvml="urn:schemas-microsoft-com:office:powerpoint" xmlns:v="urn:schemas-microsoft-com:vml" xmlns:o="urn:schemas-microsoft-com:office:office" xmlns:dgm="http://schemas.openxmlformats.org/drawingml/2006/diagram" xmlns:c="http://schemas.openxmlformats.org/drawingml/2006/chart" xmlns:mv="urn:schemas-microsoft-com:mac:vml" xmlns="">
       <p:transition>
         <p:fade/>
       </p:transition>
@@ -23075,6 +23890,644 @@
   <p:cSld>
     <p:spTree>
       <p:nvGrpSpPr>
+        <p:cNvPr id="1" name="Shape 437"/>
+        <p:cNvGrpSpPr/>
+        <p:nvPr/>
+      </p:nvGrpSpPr>
+      <p:grpSpPr>
+        <a:xfrm>
+          <a:off x="0" y="0"/>
+          <a:ext cx="0" cy="0"/>
+          <a:chOff x="0" y="0"/>
+          <a:chExt cx="0" cy="0"/>
+        </a:xfrm>
+      </p:grpSpPr>
+      <p:sp>
+        <p:nvSpPr>
+          <p:cNvPr id="438" name="Google Shape;438;p74"/>
+          <p:cNvSpPr txBox="1">
+            <a:spLocks noGrp="1"/>
+          </p:cNvSpPr>
+          <p:nvPr>
+            <p:ph type="title"/>
+          </p:nvPr>
+        </p:nvSpPr>
+        <p:spPr>
+          <a:xfrm>
+            <a:off x="311700" y="199650"/>
+            <a:ext cx="7209000" cy="393600"/>
+          </a:xfrm>
+          <a:prstGeom prst="rect">
+            <a:avLst/>
+          </a:prstGeom>
+        </p:spPr>
+        <p:txBody>
+          <a:bodyPr spcFirstLastPara="1" wrap="square" lIns="91425" tIns="91425" rIns="91425" bIns="91425" anchor="t" anchorCtr="0">
+            <a:noAutofit/>
+          </a:bodyPr>
+          <a:lstStyle/>
+          <a:p>
+            <a:pPr marL="0" lvl="0" indent="0" algn="l" rtl="0">
+              <a:spcBef>
+                <a:spcPts val="0"/>
+              </a:spcBef>
+              <a:spcAft>
+                <a:spcPts val="0"/>
+              </a:spcAft>
+              <a:buClr>
+                <a:schemeClr val="dk1"/>
+              </a:buClr>
+              <a:buSzPts val="1100"/>
+              <a:buFont typeface="Arial"/>
+              <a:buNone/>
+            </a:pPr>
+            <a:r>
+              <a:rPr lang="en" dirty="0">
+                <a:solidFill>
+                  <a:schemeClr val="lt1"/>
+                </a:solidFill>
+              </a:rPr>
+              <a:t>阅读经文：</a:t>
+            </a:r>
+            <a:r>
+              <a:rPr lang="zh-CN" altLang="en-US" dirty="0">
+                <a:solidFill>
+                  <a:schemeClr val="lt1"/>
+                </a:solidFill>
+              </a:rPr>
+              <a:t>路加福音</a:t>
+            </a:r>
+            <a:r>
+              <a:rPr lang="en-CA" altLang="zh-CN" dirty="0">
+                <a:solidFill>
+                  <a:schemeClr val="lt1"/>
+                </a:solidFill>
+              </a:rPr>
+              <a:t>9:</a:t>
+            </a:r>
+            <a:r>
+              <a:rPr lang="zh-CN" altLang="en-US" dirty="0">
+                <a:solidFill>
+                  <a:schemeClr val="lt1"/>
+                </a:solidFill>
+              </a:rPr>
+              <a:t> </a:t>
+            </a:r>
+            <a:r>
+              <a:rPr lang="en-CA" altLang="zh-CN" dirty="0">
+                <a:solidFill>
+                  <a:schemeClr val="lt1"/>
+                </a:solidFill>
+              </a:rPr>
+              <a:t>52-56</a:t>
+            </a:r>
+            <a:r>
+              <a:rPr lang="zh-CN" altLang="en-US" dirty="0">
+                <a:solidFill>
+                  <a:schemeClr val="lt1"/>
+                </a:solidFill>
+              </a:rPr>
+              <a:t>；</a:t>
+            </a:r>
+            <a:r>
+              <a:rPr lang="en-CA" altLang="zh-CN" dirty="0">
+                <a:solidFill>
+                  <a:schemeClr val="lt1"/>
+                </a:solidFill>
+              </a:rPr>
+              <a:t>10: 1-42</a:t>
+            </a:r>
+            <a:endParaRPr dirty="0">
+              <a:solidFill>
+                <a:schemeClr val="lt1"/>
+              </a:solidFill>
+            </a:endParaRPr>
+          </a:p>
+          <a:p>
+            <a:pPr marL="0" lvl="0" indent="0" algn="l" rtl="0">
+              <a:spcBef>
+                <a:spcPts val="0"/>
+              </a:spcBef>
+              <a:spcAft>
+                <a:spcPts val="0"/>
+              </a:spcAft>
+              <a:buNone/>
+            </a:pPr>
+            <a:endParaRPr dirty="0"/>
+          </a:p>
+        </p:txBody>
+      </p:sp>
+      <p:sp>
+        <p:nvSpPr>
+          <p:cNvPr id="439" name="Google Shape;439;p74"/>
+          <p:cNvSpPr txBox="1">
+            <a:spLocks noGrp="1"/>
+          </p:cNvSpPr>
+          <p:nvPr>
+            <p:ph type="body" idx="1"/>
+          </p:nvPr>
+        </p:nvSpPr>
+        <p:spPr>
+          <a:xfrm>
+            <a:off x="311700" y="561975"/>
+            <a:ext cx="8520600" cy="4080300"/>
+          </a:xfrm>
+          <a:prstGeom prst="rect">
+            <a:avLst/>
+          </a:prstGeom>
+        </p:spPr>
+        <p:txBody>
+          <a:bodyPr spcFirstLastPara="1" wrap="square" lIns="91425" tIns="91425" rIns="91425" bIns="91425" anchor="t" anchorCtr="0">
+            <a:noAutofit/>
+          </a:bodyPr>
+          <a:lstStyle/>
+          <a:p>
+            <a:pPr marL="0" lvl="0" indent="0" algn="l" rtl="0">
+              <a:lnSpc>
+                <a:spcPct val="115000"/>
+              </a:lnSpc>
+              <a:spcBef>
+                <a:spcPts val="1200"/>
+              </a:spcBef>
+              <a:spcAft>
+                <a:spcPts val="0"/>
+              </a:spcAft>
+              <a:buClr>
+                <a:schemeClr val="dk1"/>
+              </a:buClr>
+              <a:buSzPts val="1100"/>
+              <a:buFont typeface="Arial"/>
+              <a:buNone/>
+            </a:pPr>
+            <a:r>
+              <a:rPr lang="zh-CN" altLang="en-US" sz="3200" baseline="30000" dirty="0"/>
+              <a:t>撒玛利亚人不接待主</a:t>
+            </a:r>
+          </a:p>
+          <a:p>
+            <a:pPr marL="0" lvl="0" indent="0" algn="l" rtl="0">
+              <a:lnSpc>
+                <a:spcPct val="115000"/>
+              </a:lnSpc>
+              <a:spcBef>
+                <a:spcPts val="1200"/>
+              </a:spcBef>
+              <a:spcAft>
+                <a:spcPts val="0"/>
+              </a:spcAft>
+              <a:buClr>
+                <a:schemeClr val="dk1"/>
+              </a:buClr>
+              <a:buSzPts val="1100"/>
+              <a:buFont typeface="Arial"/>
+              <a:buNone/>
+            </a:pPr>
+            <a:r>
+              <a:rPr lang="en-US" altLang="zh-CN" sz="1800" baseline="30000" dirty="0"/>
+              <a:t>51</a:t>
+            </a:r>
+            <a:r>
+              <a:rPr lang="zh-CN" altLang="en-US" sz="1800" dirty="0"/>
+              <a:t>耶稣被接上升的日子快到了，他就决意向耶路撒冷去，</a:t>
+            </a:r>
+            <a:r>
+              <a:rPr lang="en-US" altLang="zh-CN" sz="1800" baseline="30000" dirty="0"/>
+              <a:t>52</a:t>
+            </a:r>
+            <a:r>
+              <a:rPr lang="zh-CN" altLang="en-US" sz="1800" dirty="0"/>
+              <a:t>并且差遣使者走在前头；他们去了，进入撒玛利亚的一个村庄，要为他预备。</a:t>
+            </a:r>
+            <a:r>
+              <a:rPr lang="en-US" altLang="zh-CN" sz="1800" baseline="30000" dirty="0"/>
+              <a:t>53</a:t>
+            </a:r>
+            <a:r>
+              <a:rPr lang="zh-CN" altLang="en-US" sz="1800" dirty="0"/>
+              <a:t>那里的人不接待他，因为他面向着耶路撒冷走。</a:t>
+            </a:r>
+            <a:r>
+              <a:rPr lang="en-US" altLang="zh-CN" sz="1800" baseline="30000" dirty="0"/>
+              <a:t>54</a:t>
+            </a:r>
+            <a:r>
+              <a:rPr lang="zh-CN" altLang="en-US" sz="1800" dirty="0"/>
+              <a:t>他的门徒雅各、约翰看见了，就说：“主啊，你要我们吩咐火从天降下来，烧灭他们吗？”</a:t>
+            </a:r>
+            <a:r>
+              <a:rPr lang="en-US" altLang="zh-CN" sz="1800" baseline="30000" dirty="0"/>
+              <a:t>55</a:t>
+            </a:r>
+            <a:r>
+              <a:rPr lang="zh-CN" altLang="en-US" sz="1800" dirty="0"/>
+              <a:t>耶稣就转过身来，责备他们，</a:t>
+            </a:r>
+            <a:r>
+              <a:rPr lang="en-US" altLang="zh-CN" sz="1800" baseline="30000" dirty="0"/>
+              <a:t>56</a:t>
+            </a:r>
+            <a:r>
+              <a:rPr lang="zh-CN" altLang="en-US" sz="1800" dirty="0"/>
+              <a:t>然后他们就往别的村庄去了。</a:t>
+            </a:r>
+          </a:p>
+        </p:txBody>
+      </p:sp>
+      <p:sp>
+        <p:nvSpPr>
+          <p:cNvPr id="440" name="Google Shape;440;p74"/>
+          <p:cNvSpPr txBox="1">
+            <a:spLocks noGrp="1"/>
+          </p:cNvSpPr>
+          <p:nvPr>
+            <p:ph type="title" idx="2"/>
+          </p:nvPr>
+        </p:nvSpPr>
+        <p:spPr>
+          <a:xfrm>
+            <a:off x="7885750" y="199650"/>
+            <a:ext cx="946500" cy="393600"/>
+          </a:xfrm>
+          <a:prstGeom prst="rect">
+            <a:avLst/>
+          </a:prstGeom>
+        </p:spPr>
+        <p:txBody>
+          <a:bodyPr spcFirstLastPara="1" wrap="square" lIns="91425" tIns="91425" rIns="91425" bIns="91425" anchor="t" anchorCtr="0">
+            <a:noAutofit/>
+          </a:bodyPr>
+          <a:lstStyle/>
+          <a:p>
+            <a:pPr marL="0" lvl="0" indent="0" algn="r" rtl="0">
+              <a:spcBef>
+                <a:spcPts val="0"/>
+              </a:spcBef>
+              <a:spcAft>
+                <a:spcPts val="0"/>
+              </a:spcAft>
+              <a:buNone/>
+            </a:pPr>
+            <a:r>
+              <a:rPr lang="en" dirty="0"/>
+              <a:t>1 / 6</a:t>
+            </a:r>
+            <a:endParaRPr dirty="0"/>
+          </a:p>
+        </p:txBody>
+      </p:sp>
+    </p:spTree>
+  </p:cSld>
+  <p:clrMapOvr>
+    <a:masterClrMapping/>
+  </p:clrMapOvr>
+</p:sld>
+</file>
+
+<file path=ppt/slides/slide16.xml><?xml version="1.0" encoding="utf-8"?>
+<p:sld xmlns:a="http://schemas.openxmlformats.org/drawingml/2006/main" xmlns:r="http://schemas.openxmlformats.org/officeDocument/2006/relationships" xmlns:p="http://schemas.openxmlformats.org/presentationml/2006/main">
+  <p:cSld>
+    <p:spTree>
+      <p:nvGrpSpPr>
+        <p:cNvPr id="1" name="Shape 437"/>
+        <p:cNvGrpSpPr/>
+        <p:nvPr/>
+      </p:nvGrpSpPr>
+      <p:grpSpPr>
+        <a:xfrm>
+          <a:off x="0" y="0"/>
+          <a:ext cx="0" cy="0"/>
+          <a:chOff x="0" y="0"/>
+          <a:chExt cx="0" cy="0"/>
+        </a:xfrm>
+      </p:grpSpPr>
+      <p:sp>
+        <p:nvSpPr>
+          <p:cNvPr id="438" name="Google Shape;438;p74"/>
+          <p:cNvSpPr txBox="1">
+            <a:spLocks noGrp="1"/>
+          </p:cNvSpPr>
+          <p:nvPr>
+            <p:ph type="title"/>
+          </p:nvPr>
+        </p:nvSpPr>
+        <p:spPr>
+          <a:xfrm>
+            <a:off x="311700" y="199650"/>
+            <a:ext cx="7209000" cy="393600"/>
+          </a:xfrm>
+          <a:prstGeom prst="rect">
+            <a:avLst/>
+          </a:prstGeom>
+        </p:spPr>
+        <p:txBody>
+          <a:bodyPr spcFirstLastPara="1" wrap="square" lIns="91425" tIns="91425" rIns="91425" bIns="91425" anchor="t" anchorCtr="0">
+            <a:noAutofit/>
+          </a:bodyPr>
+          <a:lstStyle/>
+          <a:p>
+            <a:pPr marL="0" lvl="0" indent="0" algn="l" rtl="0">
+              <a:spcBef>
+                <a:spcPts val="0"/>
+              </a:spcBef>
+              <a:spcAft>
+                <a:spcPts val="0"/>
+              </a:spcAft>
+              <a:buClr>
+                <a:schemeClr val="dk1"/>
+              </a:buClr>
+              <a:buSzPts val="1100"/>
+              <a:buFont typeface="Arial"/>
+              <a:buNone/>
+            </a:pPr>
+            <a:r>
+              <a:rPr lang="en" dirty="0">
+                <a:solidFill>
+                  <a:schemeClr val="accent6"/>
+                </a:solidFill>
+              </a:rPr>
+              <a:t>证道经文：</a:t>
+            </a:r>
+            <a:r>
+              <a:rPr lang="zh-CN" altLang="en-US" dirty="0">
+                <a:solidFill>
+                  <a:srgbClr val="FFFF00"/>
+                </a:solidFill>
+              </a:rPr>
+              <a:t>路加福音</a:t>
+            </a:r>
+            <a:r>
+              <a:rPr lang="en-CA" altLang="zh-CN" dirty="0">
+                <a:solidFill>
+                  <a:srgbClr val="FFFF00"/>
+                </a:solidFill>
+              </a:rPr>
+              <a:t>10:</a:t>
+            </a:r>
+            <a:r>
+              <a:rPr lang="zh-CN" altLang="en-US" dirty="0">
+                <a:solidFill>
+                  <a:srgbClr val="FFFF00"/>
+                </a:solidFill>
+              </a:rPr>
+              <a:t> </a:t>
+            </a:r>
+            <a:r>
+              <a:rPr lang="en-CA" altLang="zh-CN" dirty="0">
+                <a:solidFill>
+                  <a:srgbClr val="FFFF00"/>
+                </a:solidFill>
+              </a:rPr>
+              <a:t>38-42</a:t>
+            </a:r>
+            <a:endParaRPr dirty="0">
+              <a:solidFill>
+                <a:srgbClr val="FFFF00"/>
+              </a:solidFill>
+            </a:endParaRPr>
+          </a:p>
+          <a:p>
+            <a:pPr marL="0" lvl="0" indent="0" algn="l" rtl="0">
+              <a:spcBef>
+                <a:spcPts val="0"/>
+              </a:spcBef>
+              <a:spcAft>
+                <a:spcPts val="0"/>
+              </a:spcAft>
+              <a:buNone/>
+            </a:pPr>
+            <a:endParaRPr dirty="0"/>
+          </a:p>
+        </p:txBody>
+      </p:sp>
+      <p:sp>
+        <p:nvSpPr>
+          <p:cNvPr id="439" name="Google Shape;439;p74"/>
+          <p:cNvSpPr txBox="1">
+            <a:spLocks noGrp="1"/>
+          </p:cNvSpPr>
+          <p:nvPr>
+            <p:ph type="body" idx="1"/>
+          </p:nvPr>
+        </p:nvSpPr>
+        <p:spPr>
+          <a:xfrm>
+            <a:off x="311700" y="561975"/>
+            <a:ext cx="8520600" cy="4080300"/>
+          </a:xfrm>
+          <a:prstGeom prst="rect">
+            <a:avLst/>
+          </a:prstGeom>
+        </p:spPr>
+        <p:txBody>
+          <a:bodyPr spcFirstLastPara="1" wrap="square" lIns="91425" tIns="91425" rIns="91425" bIns="91425" anchor="t" anchorCtr="0">
+            <a:noAutofit/>
+          </a:bodyPr>
+          <a:lstStyle/>
+          <a:p>
+            <a:pPr marL="0" lvl="0" indent="0" algn="l" rtl="0">
+              <a:lnSpc>
+                <a:spcPct val="115000"/>
+              </a:lnSpc>
+              <a:spcBef>
+                <a:spcPts val="1200"/>
+              </a:spcBef>
+              <a:spcAft>
+                <a:spcPts val="0"/>
+              </a:spcAft>
+              <a:buClr>
+                <a:schemeClr val="dk1"/>
+              </a:buClr>
+              <a:buSzPts val="1100"/>
+              <a:buFont typeface="Arial"/>
+              <a:buNone/>
+            </a:pPr>
+            <a:r>
+              <a:rPr lang="zh-CN" altLang="en-US" sz="2400" dirty="0"/>
+              <a:t> </a:t>
+            </a:r>
+            <a:r>
+              <a:rPr lang="zh-CN" altLang="en-US" sz="2400" dirty="0">
+                <a:solidFill>
+                  <a:srgbClr val="FFFF00"/>
+                </a:solidFill>
+              </a:rPr>
+              <a:t>马大和马利亚</a:t>
+            </a:r>
+          </a:p>
+          <a:p>
+            <a:pPr marL="0" lvl="0" indent="0" algn="l" rtl="0">
+              <a:lnSpc>
+                <a:spcPct val="115000"/>
+              </a:lnSpc>
+              <a:spcBef>
+                <a:spcPts val="1200"/>
+              </a:spcBef>
+              <a:spcAft>
+                <a:spcPts val="0"/>
+              </a:spcAft>
+              <a:buClr>
+                <a:schemeClr val="dk1"/>
+              </a:buClr>
+              <a:buSzPts val="1100"/>
+              <a:buFont typeface="Arial"/>
+              <a:buNone/>
+            </a:pPr>
+            <a:r>
+              <a:rPr lang="zh-CN" altLang="en-US" sz="2400" dirty="0">
+                <a:solidFill>
+                  <a:srgbClr val="FFFF00"/>
+                </a:solidFill>
+              </a:rPr>
+              <a:t> </a:t>
+            </a:r>
+            <a:r>
+              <a:rPr lang="en-US" altLang="zh-CN" sz="2400" baseline="30000" dirty="0">
+                <a:solidFill>
+                  <a:srgbClr val="FFFF00"/>
+                </a:solidFill>
+              </a:rPr>
+              <a:t>38</a:t>
+            </a:r>
+            <a:r>
+              <a:rPr lang="zh-CN" altLang="en-US" sz="2400" dirty="0">
+                <a:solidFill>
+                  <a:srgbClr val="FFFF00"/>
+                </a:solidFill>
+              </a:rPr>
+              <a:t>他们走路的时候，耶稣进了一个村庄。有一个名叫马大的女人，接他到家里。</a:t>
+            </a:r>
+            <a:r>
+              <a:rPr lang="en-US" altLang="zh-CN" sz="2400" baseline="30000" dirty="0">
+                <a:solidFill>
+                  <a:srgbClr val="FFFF00"/>
+                </a:solidFill>
+              </a:rPr>
+              <a:t>39</a:t>
+            </a:r>
+            <a:r>
+              <a:rPr lang="zh-CN" altLang="en-US" sz="2400" dirty="0">
+                <a:solidFill>
+                  <a:srgbClr val="FFFF00"/>
+                </a:solidFill>
+              </a:rPr>
+              <a:t>她有一个妹妹，名叫马利亚，坐在主的脚前听道。</a:t>
+            </a:r>
+            <a:r>
+              <a:rPr lang="en-US" altLang="zh-CN" sz="2400" baseline="30000" dirty="0">
+                <a:solidFill>
+                  <a:srgbClr val="FFFF00"/>
+                </a:solidFill>
+              </a:rPr>
+              <a:t>40</a:t>
+            </a:r>
+            <a:r>
+              <a:rPr lang="zh-CN" altLang="en-US" sz="2400" dirty="0">
+                <a:solidFill>
+                  <a:srgbClr val="FFFF00"/>
+                </a:solidFill>
+              </a:rPr>
+              <a:t>马大被许多要作的事，弄得心烦意乱，就上前来，说：“主啊，我妹妹让我一个人侍候，你不理吗？请吩咐她来帮助我。”</a:t>
+            </a:r>
+            <a:r>
+              <a:rPr lang="en-US" altLang="zh-CN" sz="2400" baseline="30000" dirty="0">
+                <a:solidFill>
+                  <a:srgbClr val="FFFF00"/>
+                </a:solidFill>
+              </a:rPr>
+              <a:t>41</a:t>
+            </a:r>
+            <a:r>
+              <a:rPr lang="zh-CN" altLang="en-US" sz="2400" dirty="0">
+                <a:solidFill>
+                  <a:srgbClr val="FFFF00"/>
+                </a:solidFill>
+              </a:rPr>
+              <a:t>主回答她：“马大，马大，你为许多事操心忙碌，</a:t>
+            </a:r>
+            <a:r>
+              <a:rPr lang="en-US" altLang="zh-CN" sz="2400" baseline="30000" dirty="0">
+                <a:solidFill>
+                  <a:srgbClr val="FFFF00"/>
+                </a:solidFill>
+              </a:rPr>
+              <a:t>42</a:t>
+            </a:r>
+            <a:r>
+              <a:rPr lang="zh-CN" altLang="en-US" sz="2400" dirty="0">
+                <a:solidFill>
+                  <a:srgbClr val="FFFF00"/>
+                </a:solidFill>
+              </a:rPr>
+              <a:t>但是最需要的只有一件，马利亚已经选择了那上好的分，是不能从她夺去的。”</a:t>
+            </a:r>
+            <a:endParaRPr sz="2400" dirty="0">
+              <a:solidFill>
+                <a:srgbClr val="FFFF00"/>
+              </a:solidFill>
+            </a:endParaRPr>
+          </a:p>
+        </p:txBody>
+      </p:sp>
+      <p:sp>
+        <p:nvSpPr>
+          <p:cNvPr id="440" name="Google Shape;440;p74"/>
+          <p:cNvSpPr txBox="1">
+            <a:spLocks noGrp="1"/>
+          </p:cNvSpPr>
+          <p:nvPr>
+            <p:ph type="title" idx="2"/>
+          </p:nvPr>
+        </p:nvSpPr>
+        <p:spPr>
+          <a:xfrm>
+            <a:off x="7885750" y="199650"/>
+            <a:ext cx="946500" cy="393600"/>
+          </a:xfrm>
+          <a:prstGeom prst="rect">
+            <a:avLst/>
+          </a:prstGeom>
+        </p:spPr>
+        <p:txBody>
+          <a:bodyPr spcFirstLastPara="1" wrap="square" lIns="91425" tIns="91425" rIns="91425" bIns="91425" anchor="t" anchorCtr="0">
+            <a:noAutofit/>
+          </a:bodyPr>
+          <a:lstStyle/>
+          <a:p>
+            <a:pPr marL="0" lvl="0" indent="0" algn="r" rtl="0">
+              <a:spcBef>
+                <a:spcPts val="0"/>
+              </a:spcBef>
+              <a:spcAft>
+                <a:spcPts val="0"/>
+              </a:spcAft>
+              <a:buNone/>
+            </a:pPr>
+            <a:r>
+              <a:rPr lang="en" dirty="0"/>
+              <a:t>6/ 6</a:t>
+            </a:r>
+            <a:endParaRPr dirty="0"/>
+          </a:p>
+        </p:txBody>
+      </p:sp>
+    </p:spTree>
+    <p:extLst>
+      <p:ext uri="{BB962C8B-B14F-4D97-AF65-F5344CB8AC3E}">
+        <p14:creationId xmlns:p14="http://schemas.microsoft.com/office/powerpoint/2010/main" val="215013821"/>
+      </p:ext>
+    </p:extLst>
+  </p:cSld>
+  <p:clrMapOvr>
+    <a:masterClrMapping/>
+  </p:clrMapOvr>
+</p:sld>
+</file>
+
+<file path=ppt/slides/slide17.xml><?xml version="1.0" encoding="utf-8"?>
+<p:sld xmlns:a="http://schemas.openxmlformats.org/drawingml/2006/main" xmlns:r="http://schemas.openxmlformats.org/officeDocument/2006/relationships" xmlns:p="http://schemas.openxmlformats.org/presentationml/2006/main">
+  <p:cSld>
+    <p:spTree>
+      <p:nvGrpSpPr>
         <p:cNvPr id="1" name="Shape 451"/>
         <p:cNvGrpSpPr/>
         <p:nvPr/>
@@ -23195,7 +24648,7 @@
 </p:sld>
 </file>
 
-<file path=ppt/slides/slide16.xml><?xml version="1.0" encoding="utf-8"?>
+<file path=ppt/slides/slide18.xml><?xml version="1.0" encoding="utf-8"?>
 <p:sld xmlns:a="http://schemas.openxmlformats.org/drawingml/2006/main" xmlns:r="http://schemas.openxmlformats.org/officeDocument/2006/relationships" xmlns:p="http://schemas.openxmlformats.org/presentationml/2006/main">
   <p:cSld>
     <p:spTree>
@@ -23267,7 +24720,7 @@
 </p:sld>
 </file>
 
-<file path=ppt/slides/slide17.xml><?xml version="1.0" encoding="utf-8"?>
+<file path=ppt/slides/slide19.xml><?xml version="1.0" encoding="utf-8"?>
 <p:sld xmlns:a="http://schemas.openxmlformats.org/drawingml/2006/main" xmlns:r="http://schemas.openxmlformats.org/officeDocument/2006/relationships" xmlns:p="http://schemas.openxmlformats.org/presentationml/2006/main">
   <p:cSld>
     <p:bg>
@@ -23681,78 +25134,6 @@
 </p:sld>
 </file>
 
-<file path=ppt/slides/slide18.xml><?xml version="1.0" encoding="utf-8"?>
-<p:sld xmlns:a="http://schemas.openxmlformats.org/drawingml/2006/main" xmlns:r="http://schemas.openxmlformats.org/officeDocument/2006/relationships" xmlns:p="http://schemas.openxmlformats.org/presentationml/2006/main">
-  <p:cSld>
-    <p:spTree>
-      <p:nvGrpSpPr>
-        <p:cNvPr id="1" name="Shape 498"/>
-        <p:cNvGrpSpPr/>
-        <p:nvPr/>
-      </p:nvGrpSpPr>
-      <p:grpSpPr>
-        <a:xfrm>
-          <a:off x="0" y="0"/>
-          <a:ext cx="0" cy="0"/>
-          <a:chOff x="0" y="0"/>
-          <a:chExt cx="0" cy="0"/>
-        </a:xfrm>
-      </p:grpSpPr>
-      <p:sp>
-        <p:nvSpPr>
-          <p:cNvPr id="499" name="Google Shape;499;p82"/>
-          <p:cNvSpPr txBox="1">
-            <a:spLocks noGrp="1"/>
-          </p:cNvSpPr>
-          <p:nvPr>
-            <p:ph type="title"/>
-          </p:nvPr>
-        </p:nvSpPr>
-        <p:spPr>
-          <a:xfrm>
-            <a:off x="311700" y="519625"/>
-            <a:ext cx="8520600" cy="4143600"/>
-          </a:xfrm>
-          <a:prstGeom prst="rect">
-            <a:avLst/>
-          </a:prstGeom>
-        </p:spPr>
-        <p:txBody>
-          <a:bodyPr spcFirstLastPara="1" wrap="square" lIns="91425" tIns="91425" rIns="91425" bIns="91425" anchor="ctr" anchorCtr="0">
-            <a:noAutofit/>
-          </a:bodyPr>
-          <a:lstStyle/>
-          <a:p>
-            <a:pPr marL="0" lvl="0" indent="0" algn="ctr" rtl="0">
-              <a:spcBef>
-                <a:spcPts val="0"/>
-              </a:spcBef>
-              <a:spcAft>
-                <a:spcPts val="0"/>
-              </a:spcAft>
-              <a:buClr>
-                <a:schemeClr val="dk1"/>
-              </a:buClr>
-              <a:buSzPts val="1100"/>
-              <a:buFont typeface="Arial"/>
-              <a:buNone/>
-            </a:pPr>
-            <a:r>
-              <a:rPr lang="en"/>
-              <a:t>祝      福</a:t>
-            </a:r>
-            <a:endParaRPr sz="2200"/>
-          </a:p>
-        </p:txBody>
-      </p:sp>
-    </p:spTree>
-  </p:cSld>
-  <p:clrMapOvr>
-    <a:masterClrMapping/>
-  </p:clrMapOvr>
-</p:sld>
-</file>
-
 <file path=ppt/slides/slide2.xml><?xml version="1.0" encoding="utf-8"?>
 <p:sld xmlns:a="http://schemas.openxmlformats.org/drawingml/2006/main" xmlns:r="http://schemas.openxmlformats.org/officeDocument/2006/relationships" xmlns:p="http://schemas.openxmlformats.org/presentationml/2006/main">
   <p:cSld>
@@ -23847,6 +25228,78 @@
               <a:t>网上敬拜的弟兄姊妹关闭麦克风和摄像头，谢谢！</a:t>
             </a:r>
             <a:endParaRPr/>
+          </a:p>
+        </p:txBody>
+      </p:sp>
+    </p:spTree>
+  </p:cSld>
+  <p:clrMapOvr>
+    <a:masterClrMapping/>
+  </p:clrMapOvr>
+</p:sld>
+</file>
+
+<file path=ppt/slides/slide20.xml><?xml version="1.0" encoding="utf-8"?>
+<p:sld xmlns:a="http://schemas.openxmlformats.org/drawingml/2006/main" xmlns:r="http://schemas.openxmlformats.org/officeDocument/2006/relationships" xmlns:p="http://schemas.openxmlformats.org/presentationml/2006/main">
+  <p:cSld>
+    <p:spTree>
+      <p:nvGrpSpPr>
+        <p:cNvPr id="1" name="Shape 498"/>
+        <p:cNvGrpSpPr/>
+        <p:nvPr/>
+      </p:nvGrpSpPr>
+      <p:grpSpPr>
+        <a:xfrm>
+          <a:off x="0" y="0"/>
+          <a:ext cx="0" cy="0"/>
+          <a:chOff x="0" y="0"/>
+          <a:chExt cx="0" cy="0"/>
+        </a:xfrm>
+      </p:grpSpPr>
+      <p:sp>
+        <p:nvSpPr>
+          <p:cNvPr id="499" name="Google Shape;499;p82"/>
+          <p:cNvSpPr txBox="1">
+            <a:spLocks noGrp="1"/>
+          </p:cNvSpPr>
+          <p:nvPr>
+            <p:ph type="title"/>
+          </p:nvPr>
+        </p:nvSpPr>
+        <p:spPr>
+          <a:xfrm>
+            <a:off x="311700" y="519625"/>
+            <a:ext cx="8520600" cy="4143600"/>
+          </a:xfrm>
+          <a:prstGeom prst="rect">
+            <a:avLst/>
+          </a:prstGeom>
+        </p:spPr>
+        <p:txBody>
+          <a:bodyPr spcFirstLastPara="1" wrap="square" lIns="91425" tIns="91425" rIns="91425" bIns="91425" anchor="ctr" anchorCtr="0">
+            <a:noAutofit/>
+          </a:bodyPr>
+          <a:lstStyle/>
+          <a:p>
+            <a:pPr marL="0" lvl="0" indent="0" algn="ctr" rtl="0">
+              <a:spcBef>
+                <a:spcPts val="0"/>
+              </a:spcBef>
+              <a:spcAft>
+                <a:spcPts val="0"/>
+              </a:spcAft>
+              <a:buClr>
+                <a:schemeClr val="dk1"/>
+              </a:buClr>
+              <a:buSzPts val="1100"/>
+              <a:buFont typeface="Arial"/>
+              <a:buNone/>
+            </a:pPr>
+            <a:r>
+              <a:rPr lang="en"/>
+              <a:t>祝      福</a:t>
+            </a:r>
+            <a:endParaRPr sz="2200"/>
           </a:p>
         </p:txBody>
       </p:sp>

</xml_diff>

<commit_message>
generate reading & preaching scriptures
</commit_message>
<xml_diff>
--- a/templates/worship.pptx
+++ b/templates/worship.pptx
@@ -20124,7 +20124,7 @@
         <p:fade/>
       </p:transition>
     </mc:Choice>
-    <mc:Fallback xmlns:ahyp="http://schemas.microsoft.com/office/drawing/2018/hyperlinkcolor" xmlns:p15="http://schemas.microsoft.com/office/powerpoint/2012/main" xmlns:com="http://schemas.openxmlformats.org/drawingml/2006/compatibility" xmlns:pvml="urn:schemas-microsoft-com:office:powerpoint" xmlns:v="urn:schemas-microsoft-com:vml" xmlns:o="urn:schemas-microsoft-com:office:office" xmlns:dgm="http://schemas.openxmlformats.org/drawingml/2006/diagram" xmlns:c="http://schemas.openxmlformats.org/drawingml/2006/chart" xmlns:mv="urn:schemas-microsoft-com:mac:vml" xmlns="">
+    <mc:Fallback xmlns="" xmlns:mv="urn:schemas-microsoft-com:mac:vml" xmlns:c="http://schemas.openxmlformats.org/drawingml/2006/chart" xmlns:dgm="http://schemas.openxmlformats.org/drawingml/2006/diagram" xmlns:o="urn:schemas-microsoft-com:office:office" xmlns:v="urn:schemas-microsoft-com:vml" xmlns:pvml="urn:schemas-microsoft-com:office:powerpoint" xmlns:com="http://schemas.openxmlformats.org/drawingml/2006/compatibility" xmlns:p15="http://schemas.microsoft.com/office/powerpoint/2012/main" xmlns:ahyp="http://schemas.microsoft.com/office/drawing/2018/hyperlinkcolor">
       <p:transition>
         <p:fade/>
       </p:transition>
@@ -23957,46 +23957,6 @@
               </a:rPr>
               <a:t>路加福音</a:t>
             </a:r>
-            <a:r>
-              <a:rPr lang="en-CA" altLang="zh-CN" dirty="0">
-                <a:solidFill>
-                  <a:schemeClr val="lt1"/>
-                </a:solidFill>
-              </a:rPr>
-              <a:t>9:</a:t>
-            </a:r>
-            <a:r>
-              <a:rPr lang="zh-CN" altLang="en-US" dirty="0">
-                <a:solidFill>
-                  <a:schemeClr val="lt1"/>
-                </a:solidFill>
-              </a:rPr>
-              <a:t> </a:t>
-            </a:r>
-            <a:r>
-              <a:rPr lang="en-CA" altLang="zh-CN" dirty="0">
-                <a:solidFill>
-                  <a:schemeClr val="lt1"/>
-                </a:solidFill>
-              </a:rPr>
-              <a:t>52-56</a:t>
-            </a:r>
-            <a:r>
-              <a:rPr lang="zh-CN" altLang="en-US" dirty="0">
-                <a:solidFill>
-                  <a:schemeClr val="lt1"/>
-                </a:solidFill>
-              </a:rPr>
-              <a:t>；</a:t>
-            </a:r>
-            <a:r>
-              <a:rPr lang="en-CA" altLang="zh-CN" dirty="0">
-                <a:solidFill>
-                  <a:schemeClr val="lt1"/>
-                </a:solidFill>
-              </a:rPr>
-              <a:t>10: 1-42</a:t>
-            </a:r>
             <a:endParaRPr dirty="0">
               <a:solidFill>
                 <a:schemeClr val="lt1"/>
@@ -24255,30 +24215,6 @@
               </a:rPr>
               <a:t>路加福音</a:t>
             </a:r>
-            <a:r>
-              <a:rPr lang="en-CA" altLang="zh-CN" dirty="0">
-                <a:solidFill>
-                  <a:srgbClr val="FFFF00"/>
-                </a:solidFill>
-              </a:rPr>
-              <a:t>10:</a:t>
-            </a:r>
-            <a:r>
-              <a:rPr lang="zh-CN" altLang="en-US" dirty="0">
-                <a:solidFill>
-                  <a:srgbClr val="FFFF00"/>
-                </a:solidFill>
-              </a:rPr>
-              <a:t> </a:t>
-            </a:r>
-            <a:r>
-              <a:rPr lang="en-CA" altLang="zh-CN" dirty="0">
-                <a:solidFill>
-                  <a:srgbClr val="FFFF00"/>
-                </a:solidFill>
-              </a:rPr>
-              <a:t>38-42</a:t>
-            </a:r>
             <a:endParaRPr dirty="0">
               <a:solidFill>
                 <a:srgbClr val="FFFF00"/>
@@ -24343,7 +24279,7 @@
             </a:pPr>
             <a:r>
               <a:rPr lang="zh-CN" altLang="en-US" sz="2400" dirty="0"/>
-              <a:t> </a:t>
+              <a:t/>
             </a:r>
             <a:r>
               <a:rPr lang="zh-CN" altLang="en-US" sz="2400" dirty="0">
@@ -24378,7 +24314,7 @@
                   <a:srgbClr val="FFFF00"/>
                 </a:solidFill>
               </a:rPr>
-              <a:t> </a:t>
+              <a:t/>
             </a:r>
             <a:r>
               <a:rPr lang="en-US" altLang="zh-CN" sz="2400" baseline="30000" dirty="0">

</xml_diff>

<commit_message>
add baby-sitter and xiaozhushou generator
</commit_message>
<xml_diff>
--- a/templates/worship.pptx
+++ b/templates/worship.pptx
@@ -20124,7 +20124,7 @@
         <p:fade/>
       </p:transition>
     </mc:Choice>
-    <mc:Fallback xmlns="" xmlns:mv="urn:schemas-microsoft-com:mac:vml" xmlns:c="http://schemas.openxmlformats.org/drawingml/2006/chart" xmlns:dgm="http://schemas.openxmlformats.org/drawingml/2006/diagram" xmlns:o="urn:schemas-microsoft-com:office:office" xmlns:v="urn:schemas-microsoft-com:vml" xmlns:pvml="urn:schemas-microsoft-com:office:powerpoint" xmlns:com="http://schemas.openxmlformats.org/drawingml/2006/compatibility" xmlns:p15="http://schemas.microsoft.com/office/powerpoint/2012/main" xmlns:ahyp="http://schemas.microsoft.com/office/drawing/2018/hyperlinkcolor">
+    <mc:Fallback xmlns:ahyp="http://schemas.microsoft.com/office/drawing/2018/hyperlinkcolor" xmlns:p15="http://schemas.microsoft.com/office/powerpoint/2012/main" xmlns:com="http://schemas.openxmlformats.org/drawingml/2006/compatibility" xmlns:pvml="urn:schemas-microsoft-com:office:powerpoint" xmlns:v="urn:schemas-microsoft-com:vml" xmlns:o="urn:schemas-microsoft-com:office:office" xmlns:dgm="http://schemas.openxmlformats.org/drawingml/2006/diagram" xmlns:c="http://schemas.openxmlformats.org/drawingml/2006/chart" xmlns:mv="urn:schemas-microsoft-com:mac:vml" xmlns="">
       <p:transition>
         <p:fade/>
       </p:transition>
@@ -21521,14 +21521,14 @@
           <p:nvPr>
             <p:extLst>
               <p:ext uri="{D42A27DB-BD31-4B8C-83A1-F6EECF244321}">
-                <p14:modId xmlns:p14="http://schemas.microsoft.com/office/powerpoint/2010/main" val="1547341952"/>
+                <p14:modId xmlns:p14="http://schemas.microsoft.com/office/powerpoint/2010/main" val="1981439727"/>
               </p:ext>
             </p:extLst>
           </p:nvPr>
         </p:nvGraphicFramePr>
         <p:xfrm>
           <a:off x="952500" y="1428750"/>
-          <a:ext cx="7239000" cy="3154500"/>
+          <a:ext cx="7222235" cy="3205135"/>
         </p:xfrm>
         <a:graphic>
           <a:graphicData uri="http://schemas.openxmlformats.org/drawingml/2006/table">
@@ -21538,35 +21538,35 @@
                 <a:tableStyleId>{9B7AF634-6BC6-4AEA-98FA-0B733F18FF0A}</a:tableStyleId>
               </a:tblPr>
               <a:tblGrid>
-                <a:gridCol w="1447800">
+                <a:gridCol w="1444447">
                   <a:extLst>
                     <a:ext uri="{9D8B030D-6E8A-4147-A177-3AD203B41FA5}">
                       <a16:colId xmlns:a16="http://schemas.microsoft.com/office/drawing/2014/main" val="20000"/>
                     </a:ext>
                   </a:extLst>
                 </a:gridCol>
-                <a:gridCol w="1447800">
+                <a:gridCol w="1444447">
                   <a:extLst>
                     <a:ext uri="{9D8B030D-6E8A-4147-A177-3AD203B41FA5}">
                       <a16:colId xmlns:a16="http://schemas.microsoft.com/office/drawing/2014/main" val="20001"/>
                     </a:ext>
                   </a:extLst>
                 </a:gridCol>
-                <a:gridCol w="1447800">
+                <a:gridCol w="1444447">
                   <a:extLst>
                     <a:ext uri="{9D8B030D-6E8A-4147-A177-3AD203B41FA5}">
                       <a16:colId xmlns:a16="http://schemas.microsoft.com/office/drawing/2014/main" val="20002"/>
                     </a:ext>
                   </a:extLst>
                 </a:gridCol>
-                <a:gridCol w="1447800">
+                <a:gridCol w="1444447">
                   <a:extLst>
                     <a:ext uri="{9D8B030D-6E8A-4147-A177-3AD203B41FA5}">
                       <a16:colId xmlns:a16="http://schemas.microsoft.com/office/drawing/2014/main" val="20003"/>
                     </a:ext>
                   </a:extLst>
                 </a:gridCol>
-                <a:gridCol w="1447800">
+                <a:gridCol w="1444447">
                   <a:extLst>
                     <a:ext uri="{9D8B030D-6E8A-4147-A177-3AD203B41FA5}">
                       <a16:colId xmlns:a16="http://schemas.microsoft.com/office/drawing/2014/main" val="20004"/>
@@ -21574,7 +21574,7 @@
                   </a:extLst>
                 </a:gridCol>
               </a:tblGrid>
-              <a:tr h="381000">
+              <a:tr h="367343">
                 <a:tc>
                   <a:txBody>
                     <a:bodyPr/>
@@ -21590,7 +21590,7 @@
                         <a:buNone/>
                       </a:pPr>
                       <a:r>
-                        <a:rPr lang="en" sz="2000" b="1">
+                        <a:rPr lang="en" sz="1000" b="1" dirty="0" err="1">
                           <a:solidFill>
                             <a:srgbClr val="FFFFFF"/>
                           </a:solidFill>
@@ -21601,7 +21601,7 @@
                         </a:rPr>
                         <a:t>日期</a:t>
                       </a:r>
-                      <a:endParaRPr sz="2000" b="1">
+                      <a:endParaRPr sz="1000" b="1" dirty="0">
                         <a:solidFill>
                           <a:srgbClr val="FFFFFF"/>
                         </a:solidFill>
@@ -21671,7 +21671,7 @@
                         <a:buNone/>
                       </a:pPr>
                       <a:r>
-                        <a:rPr lang="en" sz="2000" b="1" dirty="0" err="1">
+                        <a:rPr lang="en" sz="1000" b="1" dirty="0" err="1">
                           <a:solidFill>
                             <a:schemeClr val="lt1"/>
                           </a:solidFill>
@@ -21682,7 +21682,7 @@
                         </a:rPr>
                         <a:t>ls日</a:t>
                       </a:r>
-                      <a:endParaRPr dirty="0"/>
+                      <a:endParaRPr sz="1000" dirty="0"/>
                     </a:p>
                   </a:txBody>
                   <a:tcPr marL="91425" marR="91425" marT="91425" marB="91425">
@@ -21744,7 +21744,7 @@
                         <a:buNone/>
                       </a:pPr>
                       <a:r>
-                        <a:rPr lang="en" sz="2000" b="1" dirty="0" err="1">
+                        <a:rPr lang="en" sz="1000" b="1" dirty="0" err="1">
                           <a:solidFill>
                             <a:schemeClr val="lt1"/>
                           </a:solidFill>
@@ -21755,7 +21755,7 @@
                         </a:rPr>
                         <a:t>ts日</a:t>
                       </a:r>
-                      <a:endParaRPr dirty="0"/>
+                      <a:endParaRPr sz="1000" dirty="0"/>
                     </a:p>
                   </a:txBody>
                   <a:tcPr marL="91425" marR="91425" marT="91425" marB="91425">
@@ -21817,7 +21817,7 @@
                         <a:buNone/>
                       </a:pPr>
                       <a:r>
-                        <a:rPr lang="en" sz="2000" b="1" dirty="0" err="1">
+                        <a:rPr lang="en" sz="1000" b="1" dirty="0" err="1">
                           <a:solidFill>
                             <a:schemeClr val="lt1"/>
                           </a:solidFill>
@@ -21828,7 +21828,7 @@
                         </a:rPr>
                         <a:t>ns日</a:t>
                       </a:r>
-                      <a:endParaRPr dirty="0"/>
+                      <a:endParaRPr sz="1000" dirty="0"/>
                     </a:p>
                   </a:txBody>
                   <a:tcPr marL="91425" marR="91425" marT="91425" marB="91425">
@@ -21890,7 +21890,7 @@
                         <a:buNone/>
                       </a:pPr>
                       <a:r>
-                        <a:rPr lang="en" sz="2000" b="1" dirty="0" err="1">
+                        <a:rPr lang="en" sz="1000" b="1" dirty="0" err="1">
                           <a:solidFill>
                             <a:schemeClr val="lt1"/>
                           </a:solidFill>
@@ -21901,7 +21901,7 @@
                         </a:rPr>
                         <a:t>nns日</a:t>
                       </a:r>
-                      <a:endParaRPr dirty="0"/>
+                      <a:endParaRPr sz="1000" dirty="0"/>
                     </a:p>
                   </a:txBody>
                   <a:tcPr marL="91425" marR="91425" marT="91425" marB="91425">
@@ -21949,7 +21949,7 @@
                   </a:ext>
                 </a:extLst>
               </a:tr>
-              <a:tr h="381000">
+              <a:tr h="528065">
                 <a:tc>
                   <a:txBody>
                     <a:bodyPr/>
@@ -21968,7 +21968,7 @@
                         <a:buNone/>
                       </a:pPr>
                       <a:r>
-                        <a:rPr lang="en" sz="2000" b="1" dirty="0" err="1">
+                        <a:rPr lang="en" sz="1000" b="1" dirty="0" err="1">
                           <a:solidFill>
                             <a:srgbClr val="FFFFFF"/>
                           </a:solidFill>
@@ -21979,7 +21979,7 @@
                         </a:rPr>
                         <a:t>带领</a:t>
                       </a:r>
-                      <a:endParaRPr sz="2000" b="1" dirty="0">
+                      <a:endParaRPr sz="1000" b="1" dirty="0">
                         <a:solidFill>
                           <a:srgbClr val="FFFFFF"/>
                         </a:solidFill>
@@ -22054,7 +22054,7 @@
                         <a:defRPr/>
                       </a:pPr>
                       <a:r>
-                        <a:rPr lang="en-CA" sz="2000" b="0" i="0" u="none" strike="noStrike" cap="none" dirty="0" err="1">
+                        <a:rPr lang="en-CA" sz="1000" b="0" i="0" u="none" strike="noStrike" cap="none" dirty="0" err="1">
                           <a:solidFill>
                             <a:schemeClr val="lt1"/>
                           </a:solidFill>
@@ -22064,7 +22064,7 @@
                         </a:rPr>
                         <a:t>lsdailing</a:t>
                       </a:r>
-                      <a:endParaRPr sz="2000" dirty="0"/>
+                      <a:endParaRPr sz="1000" dirty="0"/>
                     </a:p>
                   </a:txBody>
                   <a:tcPr marL="91425" marR="91425" marT="91425" marB="91425">
@@ -22131,7 +22131,7 @@
                         <a:defRPr/>
                       </a:pPr>
                       <a:r>
-                        <a:rPr lang="en-CA" sz="2000" b="0" i="0" u="none" strike="noStrike" cap="none" dirty="0" err="1">
+                        <a:rPr lang="en-CA" sz="1000" b="0" i="0" u="none" strike="noStrike" cap="none" dirty="0" err="1">
                           <a:solidFill>
                             <a:schemeClr val="lt1"/>
                           </a:solidFill>
@@ -22141,7 +22141,7 @@
                         </a:rPr>
                         <a:t>tsdailing</a:t>
                       </a:r>
-                      <a:endParaRPr lang="en-CA" sz="2000" b="0" i="0" u="none" strike="noStrike" cap="none" dirty="0">
+                      <a:endParaRPr lang="en-CA" sz="1000" b="0" i="0" u="none" strike="noStrike" cap="none" dirty="0">
                         <a:solidFill>
                           <a:schemeClr val="lt1"/>
                         </a:solidFill>
@@ -22165,7 +22165,7 @@
                         <a:buFont typeface="Arial"/>
                         <a:buNone/>
                       </a:pPr>
-                      <a:endParaRPr dirty="0"/>
+                      <a:endParaRPr sz="1000" dirty="0"/>
                     </a:p>
                   </a:txBody>
                   <a:tcPr marL="91425" marR="91425" marT="91425" marB="91425">
@@ -22227,7 +22227,7 @@
                         <a:buNone/>
                       </a:pPr>
                       <a:r>
-                        <a:rPr lang="en" sz="2000" dirty="0" err="1">
+                        <a:rPr lang="en" sz="1000" dirty="0" err="1">
                           <a:solidFill>
                             <a:schemeClr val="lt1"/>
                           </a:solidFill>
@@ -22238,7 +22238,7 @@
                         </a:rPr>
                         <a:t>nsdailing</a:t>
                       </a:r>
-                      <a:endParaRPr sz="2000" dirty="0"/>
+                      <a:endParaRPr sz="1000" dirty="0"/>
                     </a:p>
                   </a:txBody>
                   <a:tcPr marL="91425" marR="91425" marT="91425" marB="91425">
@@ -22300,7 +22300,7 @@
                         <a:buNone/>
                       </a:pPr>
                       <a:r>
-                        <a:rPr lang="en" sz="2000" dirty="0" err="1">
+                        <a:rPr lang="en" sz="1000" dirty="0" err="1">
                           <a:solidFill>
                             <a:schemeClr val="lt1"/>
                           </a:solidFill>
@@ -22311,7 +22311,7 @@
                         </a:rPr>
                         <a:t>nnsdailing</a:t>
                       </a:r>
-                      <a:endParaRPr lang="en-CA" sz="2000" dirty="0"/>
+                      <a:endParaRPr lang="en-CA" sz="1000" dirty="0"/>
                     </a:p>
                   </a:txBody>
                   <a:tcPr marL="91425" marR="91425" marT="91425" marB="91425">
@@ -22359,7 +22359,7 @@
                   </a:ext>
                 </a:extLst>
               </a:tr>
-              <a:tr h="381000">
+              <a:tr h="367343">
                 <a:tc>
                   <a:txBody>
                     <a:bodyPr/>
@@ -22375,7 +22375,7 @@
                         <a:buNone/>
                       </a:pPr>
                       <a:r>
-                        <a:rPr lang="en" sz="2000" b="1">
+                        <a:rPr lang="en" sz="1000" b="1" dirty="0" err="1">
                           <a:solidFill>
                             <a:srgbClr val="FFFFFF"/>
                           </a:solidFill>
@@ -22386,7 +22386,7 @@
                         </a:rPr>
                         <a:t>司事</a:t>
                       </a:r>
-                      <a:endParaRPr sz="2000" b="1">
+                      <a:endParaRPr sz="1000" b="1" dirty="0">
                         <a:solidFill>
                           <a:srgbClr val="FFFFFF"/>
                         </a:solidFill>
@@ -22456,7 +22456,7 @@
                         <a:buNone/>
                       </a:pPr>
                       <a:r>
-                        <a:rPr lang="en-CA" sz="2000" b="0" i="0" u="none" strike="noStrike" cap="none" dirty="0" err="1">
+                        <a:rPr lang="en-CA" sz="1000" b="0" i="0" u="none" strike="noStrike" cap="none" dirty="0" err="1">
                           <a:solidFill>
                             <a:schemeClr val="lt1"/>
                           </a:solidFill>
@@ -22466,7 +22466,7 @@
                         </a:rPr>
                         <a:t>lssishi</a:t>
                       </a:r>
-                      <a:endParaRPr sz="2000" b="0" i="0" u="none" strike="noStrike" cap="none" dirty="0">
+                      <a:endParaRPr sz="1000" b="0" i="0" u="none" strike="noStrike" cap="none" dirty="0">
                         <a:solidFill>
                           <a:schemeClr val="lt1"/>
                         </a:solidFill>
@@ -22535,7 +22535,7 @@
                         <a:buNone/>
                       </a:pPr>
                       <a:r>
-                        <a:rPr lang="en" sz="2000" dirty="0" err="1">
+                        <a:rPr lang="en" sz="1000" dirty="0" err="1">
                           <a:solidFill>
                             <a:schemeClr val="lt1"/>
                           </a:solidFill>
@@ -22546,7 +22546,7 @@
                         </a:rPr>
                         <a:t>tssishi</a:t>
                       </a:r>
-                      <a:endParaRPr lang="en" sz="2000" dirty="0">
+                      <a:endParaRPr lang="en" sz="1000" dirty="0">
                         <a:solidFill>
                           <a:schemeClr val="lt1"/>
                         </a:solidFill>
@@ -22616,7 +22616,7 @@
                         <a:buNone/>
                       </a:pPr>
                       <a:r>
-                        <a:rPr lang="en" sz="2000" dirty="0" err="1">
+                        <a:rPr lang="en" sz="1000" dirty="0" err="1">
                           <a:solidFill>
                             <a:schemeClr val="lt1"/>
                           </a:solidFill>
@@ -22627,7 +22627,7 @@
                         </a:rPr>
                         <a:t>nssishi</a:t>
                       </a:r>
-                      <a:endParaRPr lang="en" sz="2000" dirty="0">
+                      <a:endParaRPr lang="en" sz="1000" dirty="0">
                         <a:solidFill>
                           <a:schemeClr val="lt1"/>
                         </a:solidFill>
@@ -22697,7 +22697,7 @@
                         <a:buNone/>
                       </a:pPr>
                       <a:r>
-                        <a:rPr lang="en" sz="2000" dirty="0" err="1">
+                        <a:rPr lang="en" sz="1000" dirty="0" err="1">
                           <a:solidFill>
                             <a:schemeClr val="lt1"/>
                           </a:solidFill>
@@ -22708,7 +22708,7 @@
                         </a:rPr>
                         <a:t>nnssishi</a:t>
                       </a:r>
-                      <a:endParaRPr sz="2000" dirty="0"/>
+                      <a:endParaRPr sz="1000" dirty="0"/>
                     </a:p>
                   </a:txBody>
                   <a:tcPr marL="91425" marR="91425" marT="91425" marB="91425">
@@ -22756,7 +22756,7 @@
                   </a:ext>
                 </a:extLst>
               </a:tr>
-              <a:tr h="381000">
+              <a:tr h="367343">
                 <a:tc>
                   <a:txBody>
                     <a:bodyPr/>
@@ -22772,7 +22772,7 @@
                         <a:buNone/>
                       </a:pPr>
                       <a:r>
-                        <a:rPr lang="en" sz="2000" b="1">
+                        <a:rPr lang="en" sz="1000" b="1" dirty="0" err="1">
                           <a:solidFill>
                             <a:srgbClr val="FFFFFF"/>
                           </a:solidFill>
@@ -22783,7 +22783,7 @@
                         </a:rPr>
                         <a:t>司琴</a:t>
                       </a:r>
-                      <a:endParaRPr sz="2000" b="1">
+                      <a:endParaRPr sz="1000" b="1" dirty="0">
                         <a:solidFill>
                           <a:srgbClr val="FFFFFF"/>
                         </a:solidFill>
@@ -22853,7 +22853,7 @@
                         <a:buNone/>
                       </a:pPr>
                       <a:r>
-                        <a:rPr lang="en-CA" sz="2000" dirty="0" err="1">
+                        <a:rPr lang="en-CA" sz="1000" dirty="0" err="1">
                           <a:solidFill>
                             <a:srgbClr val="FFFFFF"/>
                           </a:solidFill>
@@ -22864,7 +22864,7 @@
                         </a:rPr>
                         <a:t>lssiqing</a:t>
                       </a:r>
-                      <a:endParaRPr sz="2000" dirty="0">
+                      <a:endParaRPr sz="1000" dirty="0">
                         <a:solidFill>
                           <a:srgbClr val="FFFFFF"/>
                         </a:solidFill>
@@ -22934,7 +22934,7 @@
                         <a:buNone/>
                       </a:pPr>
                       <a:r>
-                        <a:rPr lang="en-CA" sz="2000" dirty="0" err="1">
+                        <a:rPr lang="en-CA" sz="1000" dirty="0" err="1">
                           <a:solidFill>
                             <a:srgbClr val="FFFFFF"/>
                           </a:solidFill>
@@ -22945,7 +22945,7 @@
                         </a:rPr>
                         <a:t>tssiqing</a:t>
                       </a:r>
-                      <a:endParaRPr sz="2000" dirty="0">
+                      <a:endParaRPr sz="1000" dirty="0">
                         <a:solidFill>
                           <a:srgbClr val="FFFFFF"/>
                         </a:solidFill>
@@ -22984,7 +22984,7 @@
                       <a:headEnd type="none" w="sm" len="sm"/>
                       <a:tailEnd type="none" w="sm" len="sm"/>
                     </a:lnT>
-                    <a:lnB w="9525" cap="flat" cmpd="sng">
+                    <a:lnB w="9525" cap="flat" cmpd="sng" algn="ctr">
                       <a:solidFill>
                         <a:srgbClr val="9E9E9E"/>
                       </a:solidFill>
@@ -23015,7 +23015,7 @@
                         <a:buNone/>
                       </a:pPr>
                       <a:r>
-                        <a:rPr lang="en-CA" sz="2000" dirty="0" err="1">
+                        <a:rPr lang="en-CA" sz="1000" dirty="0" err="1">
                           <a:solidFill>
                             <a:srgbClr val="FFFFFF"/>
                           </a:solidFill>
@@ -23026,7 +23026,7 @@
                         </a:rPr>
                         <a:t>nssiqing</a:t>
                       </a:r>
-                      <a:endParaRPr sz="2000" dirty="0">
+                      <a:endParaRPr sz="1000" dirty="0">
                         <a:solidFill>
                           <a:srgbClr val="FFFFFF"/>
                         </a:solidFill>
@@ -23065,7 +23065,7 @@
                       <a:headEnd type="none" w="sm" len="sm"/>
                       <a:tailEnd type="none" w="sm" len="sm"/>
                     </a:lnT>
-                    <a:lnB w="9525" cap="flat" cmpd="sng">
+                    <a:lnB w="9525" cap="flat" cmpd="sng" algn="ctr">
                       <a:solidFill>
                         <a:srgbClr val="9E9E9E"/>
                       </a:solidFill>
@@ -23096,7 +23096,7 @@
                         <a:buNone/>
                       </a:pPr>
                       <a:r>
-                        <a:rPr lang="en" sz="2000" dirty="0" err="1">
+                        <a:rPr lang="en" sz="1000" dirty="0" err="1">
                           <a:solidFill>
                             <a:schemeClr val="lt1"/>
                           </a:solidFill>
@@ -23107,7 +23107,7 @@
                         </a:rPr>
                         <a:t>nnssiqing</a:t>
                       </a:r>
-                      <a:endParaRPr sz="2000" dirty="0">
+                      <a:endParaRPr sz="1000" dirty="0">
                         <a:solidFill>
                           <a:srgbClr val="FFFFFF"/>
                         </a:solidFill>
@@ -23146,7 +23146,7 @@
                       <a:headEnd type="none" w="sm" len="sm"/>
                       <a:tailEnd type="none" w="sm" len="sm"/>
                     </a:lnT>
-                    <a:lnB w="9525" cap="flat" cmpd="sng">
+                    <a:lnB w="9525" cap="flat" cmpd="sng" algn="ctr">
                       <a:solidFill>
                         <a:srgbClr val="9E9E9E"/>
                       </a:solidFill>
@@ -23163,7 +23163,7 @@
                   </a:ext>
                 </a:extLst>
               </a:tr>
-              <a:tr h="381000">
+              <a:tr h="436224">
                 <a:tc>
                   <a:txBody>
                     <a:bodyPr/>
@@ -23179,7 +23179,7 @@
                         <a:buNone/>
                       </a:pPr>
                       <a:r>
-                        <a:rPr lang="en" sz="2000" b="1">
+                        <a:rPr lang="en-CA" sz="1000" b="1" dirty="0">
                           <a:solidFill>
                             <a:srgbClr val="FFFFFF"/>
                           </a:solidFill>
@@ -23188,9 +23188,9 @@
                           <a:cs typeface="SimHei"/>
                           <a:sym typeface="SimHei"/>
                         </a:rPr>
-                        <a:t>司库</a:t>
+                        <a:t>Baby-Sitter</a:t>
                       </a:r>
-                      <a:endParaRPr sz="2600" b="1">
+                      <a:endParaRPr sz="1000" b="1" dirty="0">
                         <a:solidFill>
                           <a:srgbClr val="FFFFFF"/>
                         </a:solidFill>
@@ -23211,7 +23211,7 @@
                       <a:headEnd type="none" w="sm" len="sm"/>
                       <a:tailEnd type="none" w="sm" len="sm"/>
                     </a:lnL>
-                    <a:lnR w="9525" cap="flat" cmpd="sng">
+                    <a:lnR w="9525" cap="flat" cmpd="sng" algn="ctr">
                       <a:solidFill>
                         <a:srgbClr val="9E9E9E"/>
                       </a:solidFill>
@@ -23220,7 +23220,656 @@
                       <a:headEnd type="none" w="sm" len="sm"/>
                       <a:tailEnd type="none" w="sm" len="sm"/>
                     </a:lnR>
-                    <a:lnT w="9525" cap="flat" cmpd="sng">
+                    <a:lnT w="9525" cap="flat" cmpd="sng" algn="ctr">
+                      <a:solidFill>
+                        <a:srgbClr val="9E9E9E"/>
+                      </a:solidFill>
+                      <a:prstDash val="solid"/>
+                      <a:round/>
+                      <a:headEnd type="none" w="sm" len="sm"/>
+                      <a:tailEnd type="none" w="sm" len="sm"/>
+                    </a:lnT>
+                    <a:lnB w="9525" cap="flat" cmpd="sng" algn="ctr">
+                      <a:solidFill>
+                        <a:srgbClr val="9E9E9E"/>
+                      </a:solidFill>
+                      <a:prstDash val="solid"/>
+                      <a:round/>
+                      <a:headEnd type="none" w="sm" len="sm"/>
+                      <a:tailEnd type="none" w="sm" len="sm"/>
+                    </a:lnB>
+                    <a:noFill/>
+                  </a:tcPr>
+                </a:tc>
+                <a:tc>
+                  <a:txBody>
+                    <a:bodyPr/>
+                    <a:lstStyle/>
+                    <a:p>
+                      <a:pPr marL="0" lvl="0" indent="0" algn="l" rtl="0">
+                        <a:spcBef>
+                          <a:spcPts val="0"/>
+                        </a:spcBef>
+                        <a:spcAft>
+                          <a:spcPts val="0"/>
+                        </a:spcAft>
+                        <a:buNone/>
+                      </a:pPr>
+                      <a:r>
+                        <a:rPr lang="en-CA" sz="1000" dirty="0" err="1">
+                          <a:solidFill>
+                            <a:srgbClr val="FFFFFF"/>
+                          </a:solidFill>
+                          <a:latin typeface="SimHei"/>
+                          <a:ea typeface="SimHei"/>
+                          <a:cs typeface="SimHei"/>
+                          <a:sym typeface="SimHei"/>
+                        </a:rPr>
+                        <a:t>lsbabysitter</a:t>
+                      </a:r>
+                      <a:endParaRPr sz="1000" dirty="0">
+                        <a:solidFill>
+                          <a:srgbClr val="FFFFFF"/>
+                        </a:solidFill>
+                        <a:latin typeface="SimHei"/>
+                        <a:ea typeface="SimHei"/>
+                        <a:cs typeface="SimHei"/>
+                        <a:sym typeface="SimHei"/>
+                      </a:endParaRPr>
+                    </a:p>
+                  </a:txBody>
+                  <a:tcPr marL="91425" marR="91425" marT="91425" marB="91425">
+                    <a:lnL w="9525" cap="flat" cmpd="sng" algn="ctr">
+                      <a:solidFill>
+                        <a:srgbClr val="9E9E9E"/>
+                      </a:solidFill>
+                      <a:prstDash val="solid"/>
+                      <a:round/>
+                      <a:headEnd type="none" w="sm" len="sm"/>
+                      <a:tailEnd type="none" w="sm" len="sm"/>
+                    </a:lnL>
+                    <a:lnT w="9525" cap="flat" cmpd="sng" algn="ctr">
+                      <a:solidFill>
+                        <a:srgbClr val="9E9E9E"/>
+                      </a:solidFill>
+                      <a:prstDash val="solid"/>
+                      <a:round/>
+                      <a:headEnd type="none" w="sm" len="sm"/>
+                      <a:tailEnd type="none" w="sm" len="sm"/>
+                    </a:lnT>
+                    <a:lnB w="9525" cap="flat" cmpd="sng" algn="ctr">
+                      <a:solidFill>
+                        <a:srgbClr val="9E9E9E"/>
+                      </a:solidFill>
+                      <a:prstDash val="solid"/>
+                      <a:round/>
+                      <a:headEnd type="none" w="sm" len="sm"/>
+                      <a:tailEnd type="none" w="sm" len="sm"/>
+                    </a:lnB>
+                  </a:tcPr>
+                </a:tc>
+                <a:tc>
+                  <a:txBody>
+                    <a:bodyPr/>
+                    <a:lstStyle/>
+                    <a:p>
+                      <a:pPr marL="0" lvl="0" indent="0" algn="l" rtl="0">
+                        <a:spcBef>
+                          <a:spcPts val="0"/>
+                        </a:spcBef>
+                        <a:spcAft>
+                          <a:spcPts val="0"/>
+                        </a:spcAft>
+                        <a:buNone/>
+                      </a:pPr>
+                      <a:r>
+                        <a:rPr lang="en-CA" sz="1000" dirty="0" err="1">
+                          <a:solidFill>
+                            <a:srgbClr val="FFFFFF"/>
+                          </a:solidFill>
+                          <a:latin typeface="SimHei"/>
+                          <a:ea typeface="SimHei"/>
+                          <a:cs typeface="SimHei"/>
+                          <a:sym typeface="SimHei"/>
+                        </a:rPr>
+                        <a:t>tsbabysitter</a:t>
+                      </a:r>
+                      <a:endParaRPr sz="1000" dirty="0">
+                        <a:solidFill>
+                          <a:srgbClr val="FFFFFF"/>
+                        </a:solidFill>
+                        <a:latin typeface="SimHei"/>
+                        <a:ea typeface="SimHei"/>
+                        <a:cs typeface="SimHei"/>
+                        <a:sym typeface="SimHei"/>
+                      </a:endParaRPr>
+                    </a:p>
+                  </a:txBody>
+                  <a:tcPr marL="91425" marR="91425" marT="91425" marB="91425">
+                    <a:lnT w="9525" cap="flat" cmpd="sng" algn="ctr">
+                      <a:solidFill>
+                        <a:srgbClr val="9E9E9E"/>
+                      </a:solidFill>
+                      <a:prstDash val="solid"/>
+                      <a:round/>
+                      <a:headEnd type="none" w="sm" len="sm"/>
+                      <a:tailEnd type="none" w="sm" len="sm"/>
+                    </a:lnT>
+                    <a:lnB w="9525" cap="flat" cmpd="sng" algn="ctr">
+                      <a:solidFill>
+                        <a:srgbClr val="9E9E9E"/>
+                      </a:solidFill>
+                      <a:prstDash val="solid"/>
+                      <a:round/>
+                      <a:headEnd type="none" w="sm" len="sm"/>
+                      <a:tailEnd type="none" w="sm" len="sm"/>
+                    </a:lnB>
+                  </a:tcPr>
+                </a:tc>
+                <a:tc>
+                  <a:txBody>
+                    <a:bodyPr/>
+                    <a:lstStyle/>
+                    <a:p>
+                      <a:pPr marL="0" lvl="0" indent="0" algn="l" rtl="0">
+                        <a:spcBef>
+                          <a:spcPts val="0"/>
+                        </a:spcBef>
+                        <a:spcAft>
+                          <a:spcPts val="0"/>
+                        </a:spcAft>
+                        <a:buNone/>
+                      </a:pPr>
+                      <a:r>
+                        <a:rPr lang="en-CA" sz="1000" dirty="0" err="1">
+                          <a:solidFill>
+                            <a:srgbClr val="FFFFFF"/>
+                          </a:solidFill>
+                          <a:latin typeface="SimHei"/>
+                          <a:ea typeface="SimHei"/>
+                          <a:cs typeface="SimHei"/>
+                          <a:sym typeface="SimHei"/>
+                        </a:rPr>
+                        <a:t>nsbabysitter</a:t>
+                      </a:r>
+                      <a:endParaRPr sz="1000" dirty="0">
+                        <a:solidFill>
+                          <a:srgbClr val="FFFFFF"/>
+                        </a:solidFill>
+                        <a:latin typeface="SimHei"/>
+                        <a:ea typeface="SimHei"/>
+                        <a:cs typeface="SimHei"/>
+                        <a:sym typeface="SimHei"/>
+                      </a:endParaRPr>
+                    </a:p>
+                  </a:txBody>
+                  <a:tcPr marL="91425" marR="91425" marT="91425" marB="91425">
+                    <a:lnT w="9525" cap="flat" cmpd="sng" algn="ctr">
+                      <a:solidFill>
+                        <a:srgbClr val="9E9E9E"/>
+                      </a:solidFill>
+                      <a:prstDash val="solid"/>
+                      <a:round/>
+                      <a:headEnd type="none" w="sm" len="sm"/>
+                      <a:tailEnd type="none" w="sm" len="sm"/>
+                    </a:lnT>
+                    <a:lnB w="9525" cap="flat" cmpd="sng" algn="ctr">
+                      <a:solidFill>
+                        <a:srgbClr val="9E9E9E"/>
+                      </a:solidFill>
+                      <a:prstDash val="solid"/>
+                      <a:round/>
+                      <a:headEnd type="none" w="sm" len="sm"/>
+                      <a:tailEnd type="none" w="sm" len="sm"/>
+                    </a:lnB>
+                  </a:tcPr>
+                </a:tc>
+                <a:tc>
+                  <a:txBody>
+                    <a:bodyPr/>
+                    <a:lstStyle/>
+                    <a:p>
+                      <a:pPr marL="0" lvl="0" indent="0" algn="l" rtl="0">
+                        <a:spcBef>
+                          <a:spcPts val="0"/>
+                        </a:spcBef>
+                        <a:spcAft>
+                          <a:spcPts val="0"/>
+                        </a:spcAft>
+                        <a:buNone/>
+                      </a:pPr>
+                      <a:r>
+                        <a:rPr lang="en-CA" sz="1000" dirty="0" err="1">
+                          <a:solidFill>
+                            <a:srgbClr val="FFFFFF"/>
+                          </a:solidFill>
+                          <a:latin typeface="SimHei"/>
+                          <a:ea typeface="SimHei"/>
+                          <a:cs typeface="SimHei"/>
+                          <a:sym typeface="SimHei"/>
+                        </a:rPr>
+                        <a:t>nnsbabysitter</a:t>
+                      </a:r>
+                      <a:endParaRPr sz="1000" dirty="0">
+                        <a:solidFill>
+                          <a:srgbClr val="FFFFFF"/>
+                        </a:solidFill>
+                        <a:latin typeface="SimHei"/>
+                        <a:ea typeface="SimHei"/>
+                        <a:cs typeface="SimHei"/>
+                        <a:sym typeface="SimHei"/>
+                      </a:endParaRPr>
+                    </a:p>
+                  </a:txBody>
+                  <a:tcPr marL="91425" marR="91425" marT="91425" marB="91425">
+                    <a:lnT w="9525" cap="flat" cmpd="sng" algn="ctr">
+                      <a:solidFill>
+                        <a:srgbClr val="9E9E9E"/>
+                      </a:solidFill>
+                      <a:prstDash val="solid"/>
+                      <a:round/>
+                      <a:headEnd type="none" w="sm" len="sm"/>
+                      <a:tailEnd type="none" w="sm" len="sm"/>
+                    </a:lnT>
+                    <a:lnB w="9525" cap="flat" cmpd="sng" algn="ctr">
+                      <a:solidFill>
+                        <a:srgbClr val="9E9E9E"/>
+                      </a:solidFill>
+                      <a:prstDash val="solid"/>
+                      <a:round/>
+                      <a:headEnd type="none" w="sm" len="sm"/>
+                      <a:tailEnd type="none" w="sm" len="sm"/>
+                    </a:lnB>
+                  </a:tcPr>
+                </a:tc>
+                <a:extLst>
+                  <a:ext uri="{0D108BD9-81ED-4DB2-BD59-A6C34878D82A}">
+                    <a16:rowId xmlns:a16="http://schemas.microsoft.com/office/drawing/2014/main" val="1785493370"/>
+                  </a:ext>
+                </a:extLst>
+              </a:tr>
+              <a:tr h="436224">
+                <a:tc>
+                  <a:txBody>
+                    <a:bodyPr/>
+                    <a:lstStyle/>
+                    <a:p>
+                      <a:pPr marL="0" lvl="0" indent="0" algn="l" rtl="0">
+                        <a:spcBef>
+                          <a:spcPts val="0"/>
+                        </a:spcBef>
+                        <a:spcAft>
+                          <a:spcPts val="0"/>
+                        </a:spcAft>
+                        <a:buNone/>
+                      </a:pPr>
+                      <a:r>
+                        <a:rPr lang="en-CA" sz="1000" b="1" dirty="0" err="1">
+                          <a:solidFill>
+                            <a:srgbClr val="FFFFFF"/>
+                          </a:solidFill>
+                          <a:latin typeface="SimHei"/>
+                          <a:ea typeface="SimHei"/>
+                          <a:cs typeface="SimHei"/>
+                          <a:sym typeface="SimHei"/>
+                        </a:rPr>
+                        <a:t>小助手</a:t>
+                      </a:r>
+                      <a:endParaRPr sz="1000" b="1" dirty="0">
+                        <a:solidFill>
+                          <a:srgbClr val="FFFFFF"/>
+                        </a:solidFill>
+                        <a:latin typeface="SimHei"/>
+                        <a:ea typeface="SimHei"/>
+                        <a:cs typeface="SimHei"/>
+                        <a:sym typeface="SimHei"/>
+                      </a:endParaRPr>
+                    </a:p>
+                  </a:txBody>
+                  <a:tcPr marL="91425" marR="91425" marT="91425" marB="91425">
+                    <a:lnL w="9525" cap="flat" cmpd="sng">
+                      <a:solidFill>
+                        <a:srgbClr val="9E9E9E"/>
+                      </a:solidFill>
+                      <a:prstDash val="solid"/>
+                      <a:round/>
+                      <a:headEnd type="none" w="sm" len="sm"/>
+                      <a:tailEnd type="none" w="sm" len="sm"/>
+                    </a:lnL>
+                    <a:lnR w="9525" cap="flat" cmpd="sng" algn="ctr">
+                      <a:solidFill>
+                        <a:srgbClr val="9E9E9E"/>
+                      </a:solidFill>
+                      <a:prstDash val="solid"/>
+                      <a:round/>
+                      <a:headEnd type="none" w="sm" len="sm"/>
+                      <a:tailEnd type="none" w="sm" len="sm"/>
+                    </a:lnR>
+                    <a:lnT w="9525" cap="flat" cmpd="sng" algn="ctr">
+                      <a:solidFill>
+                        <a:srgbClr val="9E9E9E"/>
+                      </a:solidFill>
+                      <a:prstDash val="solid"/>
+                      <a:round/>
+                      <a:headEnd type="none" w="sm" len="sm"/>
+                      <a:tailEnd type="none" w="sm" len="sm"/>
+                    </a:lnT>
+                    <a:lnB w="9525" cap="flat" cmpd="sng" algn="ctr">
+                      <a:solidFill>
+                        <a:srgbClr val="9E9E9E"/>
+                      </a:solidFill>
+                      <a:prstDash val="solid"/>
+                      <a:round/>
+                      <a:headEnd type="none" w="sm" len="sm"/>
+                      <a:tailEnd type="none" w="sm" len="sm"/>
+                    </a:lnB>
+                  </a:tcPr>
+                </a:tc>
+                <a:tc>
+                  <a:txBody>
+                    <a:bodyPr/>
+                    <a:lstStyle/>
+                    <a:p>
+                      <a:pPr marL="0" lvl="0" indent="0" algn="l" rtl="0">
+                        <a:spcBef>
+                          <a:spcPts val="0"/>
+                        </a:spcBef>
+                        <a:spcAft>
+                          <a:spcPts val="0"/>
+                        </a:spcAft>
+                        <a:buNone/>
+                      </a:pPr>
+                      <a:r>
+                        <a:rPr lang="en-CA" sz="1000" dirty="0" err="1">
+                          <a:solidFill>
+                            <a:srgbClr val="FFFFFF"/>
+                          </a:solidFill>
+                          <a:latin typeface="SimHei"/>
+                          <a:ea typeface="SimHei"/>
+                          <a:cs typeface="SimHei"/>
+                          <a:sym typeface="SimHei"/>
+                        </a:rPr>
+                        <a:t>lsxiaozhushou</a:t>
+                      </a:r>
+                      <a:endParaRPr sz="1000" dirty="0">
+                        <a:solidFill>
+                          <a:srgbClr val="FFFFFF"/>
+                        </a:solidFill>
+                        <a:latin typeface="SimHei"/>
+                        <a:ea typeface="SimHei"/>
+                        <a:cs typeface="SimHei"/>
+                        <a:sym typeface="SimHei"/>
+                      </a:endParaRPr>
+                    </a:p>
+                  </a:txBody>
+                  <a:tcPr marL="91425" marR="91425" marT="91425" marB="91425">
+                    <a:lnL w="9525" cap="flat" cmpd="sng" algn="ctr">
+                      <a:solidFill>
+                        <a:srgbClr val="9E9E9E"/>
+                      </a:solidFill>
+                      <a:prstDash val="solid"/>
+                      <a:round/>
+                      <a:headEnd type="none" w="sm" len="sm"/>
+                      <a:tailEnd type="none" w="sm" len="sm"/>
+                    </a:lnL>
+                    <a:lnT w="9525" cap="flat" cmpd="sng" algn="ctr">
+                      <a:solidFill>
+                        <a:srgbClr val="9E9E9E"/>
+                      </a:solidFill>
+                      <a:prstDash val="solid"/>
+                      <a:round/>
+                      <a:headEnd type="none" w="sm" len="sm"/>
+                      <a:tailEnd type="none" w="sm" len="sm"/>
+                    </a:lnT>
+                    <a:lnB w="9525" cap="flat" cmpd="sng" algn="ctr">
+                      <a:solidFill>
+                        <a:srgbClr val="9E9E9E"/>
+                      </a:solidFill>
+                      <a:prstDash val="solid"/>
+                      <a:round/>
+                      <a:headEnd type="none" w="sm" len="sm"/>
+                      <a:tailEnd type="none" w="sm" len="sm"/>
+                    </a:lnB>
+                  </a:tcPr>
+                </a:tc>
+                <a:tc>
+                  <a:txBody>
+                    <a:bodyPr/>
+                    <a:lstStyle/>
+                    <a:p>
+                      <a:pPr marL="0" lvl="0" indent="0" algn="l" rtl="0">
+                        <a:spcBef>
+                          <a:spcPts val="0"/>
+                        </a:spcBef>
+                        <a:spcAft>
+                          <a:spcPts val="0"/>
+                        </a:spcAft>
+                        <a:buNone/>
+                      </a:pPr>
+                      <a:r>
+                        <a:rPr lang="en-CA" sz="1000" dirty="0" err="1">
+                          <a:solidFill>
+                            <a:srgbClr val="FFFFFF"/>
+                          </a:solidFill>
+                          <a:latin typeface="SimHei"/>
+                          <a:ea typeface="SimHei"/>
+                          <a:cs typeface="SimHei"/>
+                          <a:sym typeface="SimHei"/>
+                        </a:rPr>
+                        <a:t>tsxiaozhushou</a:t>
+                      </a:r>
+                      <a:endParaRPr sz="1000" dirty="0">
+                        <a:solidFill>
+                          <a:srgbClr val="FFFFFF"/>
+                        </a:solidFill>
+                        <a:latin typeface="SimHei"/>
+                        <a:ea typeface="SimHei"/>
+                        <a:cs typeface="SimHei"/>
+                        <a:sym typeface="SimHei"/>
+                      </a:endParaRPr>
+                    </a:p>
+                  </a:txBody>
+                  <a:tcPr marL="91425" marR="91425" marT="91425" marB="91425">
+                    <a:lnT w="9525" cap="flat" cmpd="sng" algn="ctr">
+                      <a:solidFill>
+                        <a:srgbClr val="9E9E9E"/>
+                      </a:solidFill>
+                      <a:prstDash val="solid"/>
+                      <a:round/>
+                      <a:headEnd type="none" w="sm" len="sm"/>
+                      <a:tailEnd type="none" w="sm" len="sm"/>
+                    </a:lnT>
+                    <a:lnB w="9525" cap="flat" cmpd="sng" algn="ctr">
+                      <a:solidFill>
+                        <a:srgbClr val="9E9E9E"/>
+                      </a:solidFill>
+                      <a:prstDash val="solid"/>
+                      <a:round/>
+                      <a:headEnd type="none" w="sm" len="sm"/>
+                      <a:tailEnd type="none" w="sm" len="sm"/>
+                    </a:lnB>
+                  </a:tcPr>
+                </a:tc>
+                <a:tc>
+                  <a:txBody>
+                    <a:bodyPr/>
+                    <a:lstStyle/>
+                    <a:p>
+                      <a:pPr marL="0" lvl="0" indent="0" algn="l" rtl="0">
+                        <a:spcBef>
+                          <a:spcPts val="0"/>
+                        </a:spcBef>
+                        <a:spcAft>
+                          <a:spcPts val="0"/>
+                        </a:spcAft>
+                        <a:buNone/>
+                      </a:pPr>
+                      <a:r>
+                        <a:rPr lang="en-CA" sz="1000" dirty="0" err="1">
+                          <a:solidFill>
+                            <a:srgbClr val="FFFFFF"/>
+                          </a:solidFill>
+                          <a:latin typeface="SimHei"/>
+                          <a:ea typeface="SimHei"/>
+                          <a:cs typeface="SimHei"/>
+                          <a:sym typeface="SimHei"/>
+                        </a:rPr>
+                        <a:t>nsxiaozhushou</a:t>
+                      </a:r>
+                      <a:endParaRPr sz="1000" dirty="0">
+                        <a:solidFill>
+                          <a:srgbClr val="FFFFFF"/>
+                        </a:solidFill>
+                        <a:latin typeface="SimHei"/>
+                        <a:ea typeface="SimHei"/>
+                        <a:cs typeface="SimHei"/>
+                        <a:sym typeface="SimHei"/>
+                      </a:endParaRPr>
+                    </a:p>
+                  </a:txBody>
+                  <a:tcPr marL="91425" marR="91425" marT="91425" marB="91425">
+                    <a:lnT w="9525" cap="flat" cmpd="sng" algn="ctr">
+                      <a:solidFill>
+                        <a:srgbClr val="9E9E9E"/>
+                      </a:solidFill>
+                      <a:prstDash val="solid"/>
+                      <a:round/>
+                      <a:headEnd type="none" w="sm" len="sm"/>
+                      <a:tailEnd type="none" w="sm" len="sm"/>
+                    </a:lnT>
+                    <a:lnB w="9525" cap="flat" cmpd="sng" algn="ctr">
+                      <a:solidFill>
+                        <a:srgbClr val="9E9E9E"/>
+                      </a:solidFill>
+                      <a:prstDash val="solid"/>
+                      <a:round/>
+                      <a:headEnd type="none" w="sm" len="sm"/>
+                      <a:tailEnd type="none" w="sm" len="sm"/>
+                    </a:lnB>
+                  </a:tcPr>
+                </a:tc>
+                <a:tc>
+                  <a:txBody>
+                    <a:bodyPr/>
+                    <a:lstStyle/>
+                    <a:p>
+                      <a:pPr marL="0" lvl="0" indent="0" algn="l" rtl="0">
+                        <a:spcBef>
+                          <a:spcPts val="0"/>
+                        </a:spcBef>
+                        <a:spcAft>
+                          <a:spcPts val="0"/>
+                        </a:spcAft>
+                        <a:buNone/>
+                      </a:pPr>
+                      <a:r>
+                        <a:rPr lang="en-CA" sz="1000" dirty="0" err="1">
+                          <a:solidFill>
+                            <a:srgbClr val="FFFFFF"/>
+                          </a:solidFill>
+                          <a:latin typeface="SimHei"/>
+                          <a:ea typeface="SimHei"/>
+                          <a:cs typeface="SimHei"/>
+                          <a:sym typeface="SimHei"/>
+                        </a:rPr>
+                        <a:t>nnsxiaozhushou</a:t>
+                      </a:r>
+                      <a:endParaRPr sz="1000" dirty="0">
+                        <a:solidFill>
+                          <a:srgbClr val="FFFFFF"/>
+                        </a:solidFill>
+                        <a:latin typeface="SimHei"/>
+                        <a:ea typeface="SimHei"/>
+                        <a:cs typeface="SimHei"/>
+                        <a:sym typeface="SimHei"/>
+                      </a:endParaRPr>
+                    </a:p>
+                  </a:txBody>
+                  <a:tcPr marL="91425" marR="91425" marT="91425" marB="91425">
+                    <a:lnT w="9525" cap="flat" cmpd="sng" algn="ctr">
+                      <a:solidFill>
+                        <a:srgbClr val="9E9E9E"/>
+                      </a:solidFill>
+                      <a:prstDash val="solid"/>
+                      <a:round/>
+                      <a:headEnd type="none" w="sm" len="sm"/>
+                      <a:tailEnd type="none" w="sm" len="sm"/>
+                    </a:lnT>
+                    <a:lnB w="9525" cap="flat" cmpd="sng" algn="ctr">
+                      <a:solidFill>
+                        <a:srgbClr val="9E9E9E"/>
+                      </a:solidFill>
+                      <a:prstDash val="solid"/>
+                      <a:round/>
+                      <a:headEnd type="none" w="sm" len="sm"/>
+                      <a:tailEnd type="none" w="sm" len="sm"/>
+                    </a:lnB>
+                  </a:tcPr>
+                </a:tc>
+                <a:extLst>
+                  <a:ext uri="{0D108BD9-81ED-4DB2-BD59-A6C34878D82A}">
+                    <a16:rowId xmlns:a16="http://schemas.microsoft.com/office/drawing/2014/main" val="1517263906"/>
+                  </a:ext>
+                </a:extLst>
+              </a:tr>
+              <a:tr h="367343">
+                <a:tc>
+                  <a:txBody>
+                    <a:bodyPr/>
+                    <a:lstStyle/>
+                    <a:p>
+                      <a:pPr marL="0" lvl="0" indent="0" algn="l" rtl="0">
+                        <a:spcBef>
+                          <a:spcPts val="0"/>
+                        </a:spcBef>
+                        <a:spcAft>
+                          <a:spcPts val="0"/>
+                        </a:spcAft>
+                        <a:buNone/>
+                      </a:pPr>
+                      <a:r>
+                        <a:rPr lang="en" sz="1000" b="1" dirty="0" err="1">
+                          <a:solidFill>
+                            <a:srgbClr val="FFFFFF"/>
+                          </a:solidFill>
+                          <a:latin typeface="SimHei"/>
+                          <a:ea typeface="SimHei"/>
+                          <a:cs typeface="SimHei"/>
+                          <a:sym typeface="SimHei"/>
+                        </a:rPr>
+                        <a:t>司库</a:t>
+                      </a:r>
+                      <a:endParaRPr sz="1000" b="1" dirty="0">
+                        <a:solidFill>
+                          <a:srgbClr val="FFFFFF"/>
+                        </a:solidFill>
+                        <a:latin typeface="SimHei"/>
+                        <a:ea typeface="SimHei"/>
+                        <a:cs typeface="SimHei"/>
+                        <a:sym typeface="SimHei"/>
+                      </a:endParaRPr>
+                    </a:p>
+                  </a:txBody>
+                  <a:tcPr marL="91425" marR="91425" marT="91425" marB="91425">
+                    <a:lnL w="9525" cap="flat" cmpd="sng">
+                      <a:solidFill>
+                        <a:srgbClr val="9E9E9E"/>
+                      </a:solidFill>
+                      <a:prstDash val="solid"/>
+                      <a:round/>
+                      <a:headEnd type="none" w="sm" len="sm"/>
+                      <a:tailEnd type="none" w="sm" len="sm"/>
+                    </a:lnL>
+                    <a:lnR w="9525" cap="flat" cmpd="sng" algn="ctr">
+                      <a:solidFill>
+                        <a:srgbClr val="9E9E9E"/>
+                      </a:solidFill>
+                      <a:prstDash val="solid"/>
+                      <a:round/>
+                      <a:headEnd type="none" w="sm" len="sm"/>
+                      <a:tailEnd type="none" w="sm" len="sm"/>
+                    </a:lnR>
+                    <a:lnT w="9525" cap="flat" cmpd="sng" algn="ctr">
                       <a:solidFill>
                         <a:srgbClr val="9E9E9E"/>
                       </a:solidFill>
@@ -23255,7 +23904,7 @@
                         <a:buNone/>
                       </a:pPr>
                       <a:r>
-                        <a:rPr lang="en-US" sz="2000" dirty="0">
+                        <a:rPr lang="en-US" sz="1000" dirty="0">
                           <a:solidFill>
                             <a:srgbClr val="FFFFFF"/>
                           </a:solidFill>
@@ -23264,10 +23913,10 @@
                           <a:cs typeface="SimHei"/>
                           <a:sym typeface="SimHei"/>
                         </a:rPr>
-                        <a:t>Joy</a:t>
+                        <a:t>Sarah</a:t>
                       </a:r>
                       <a:r>
-                        <a:rPr lang="en" sz="2000" dirty="0">
+                        <a:rPr lang="en" sz="1000" dirty="0">
                           <a:solidFill>
                             <a:srgbClr val="FFFFFF"/>
                           </a:solidFill>
@@ -23278,7 +23927,7 @@
                         </a:rPr>
                         <a:t>，Serena</a:t>
                       </a:r>
-                      <a:endParaRPr sz="2600" dirty="0">
+                      <a:endParaRPr sz="1000" dirty="0">
                         <a:solidFill>
                           <a:srgbClr val="FFFFFF"/>
                         </a:solidFill>
@@ -23290,7 +23939,7 @@
                     </a:p>
                   </a:txBody>
                   <a:tcPr marL="91425" marR="91425" marT="91425" marB="91425">
-                    <a:lnL w="9525" cap="flat" cmpd="sng">
+                    <a:lnL w="9525" cap="flat" cmpd="sng" algn="ctr">
                       <a:solidFill>
                         <a:srgbClr val="9E9E9E"/>
                       </a:solidFill>
@@ -23299,7 +23948,7 @@
                       <a:headEnd type="none" w="sm" len="sm"/>
                       <a:tailEnd type="none" w="sm" len="sm"/>
                     </a:lnL>
-                    <a:lnT w="9525" cap="flat" cmpd="sng">
+                    <a:lnT w="9525" cap="flat" cmpd="sng" algn="ctr">
                       <a:solidFill>
                         <a:srgbClr val="9E9E9E"/>
                       </a:solidFill>
@@ -23355,7 +24004,7 @@
                   </a:ext>
                 </a:extLst>
               </a:tr>
-              <a:tr h="381000">
+              <a:tr h="309942">
                 <a:tc gridSpan="5">
                   <a:txBody>
                     <a:bodyPr/>
@@ -23371,7 +24020,7 @@
                         <a:buNone/>
                       </a:pPr>
                       <a:r>
-                        <a:rPr lang="en" sz="1500" i="1" dirty="0">
+                        <a:rPr lang="en" sz="1000" i="1" dirty="0">
                           <a:solidFill>
                             <a:srgbClr val="FFFFFF"/>
                           </a:solidFill>
@@ -23382,7 +24031,7 @@
                         </a:rPr>
                         <a:t>服侍人员如遇当日因故不能当值，请自行找弟兄姊妹调换。</a:t>
                       </a:r>
-                      <a:endParaRPr sz="1500" i="1" dirty="0">
+                      <a:endParaRPr sz="1000" i="1" dirty="0">
                         <a:solidFill>
                           <a:srgbClr val="FFFFFF"/>
                         </a:solidFill>
@@ -24278,10 +24927,6 @@
               <a:buNone/>
             </a:pPr>
             <a:r>
-              <a:rPr lang="zh-CN" altLang="en-US" sz="2400" dirty="0"/>
-              <a:t/>
-            </a:r>
-            <a:r>
               <a:rPr lang="zh-CN" altLang="en-US" sz="2400" dirty="0">
                 <a:solidFill>
                   <a:srgbClr val="FFFF00"/>
@@ -24308,14 +24953,6 @@
               <a:buFont typeface="Arial"/>
               <a:buNone/>
             </a:pPr>
-            <a:r>
-              <a:rPr lang="zh-CN" altLang="en-US" sz="2400" dirty="0">
-                <a:solidFill>
-                  <a:srgbClr val="FFFF00"/>
-                </a:solidFill>
-              </a:rPr>
-              <a:t/>
-            </a:r>
             <a:r>
               <a:rPr lang="en-US" altLang="zh-CN" sz="2400" baseline="30000" dirty="0">
                 <a:solidFill>

</xml_diff>